<commit_message>
updated the block diagrams
</commit_message>
<xml_diff>
--- a/report/images.pptx
+++ b/report/images.pptx
@@ -110,6 +110,11 @@
       </a:defRPr>
     </a:lvl9pPr>
   </p:defaultTextStyle>
+  <p:extLst>
+    <p:ext uri="{EFAFB233-063F-42B5-8137-9DF3F51BA10A}">
+      <p15:sldGuideLst xmlns:p15="http://schemas.microsoft.com/office/powerpoint/2012/main"/>
+    </p:ext>
+  </p:extLst>
 </p:presentation>
 </file>
 
@@ -3329,10 +3334,10 @@
       </p:grpSpPr>
       <p:pic>
         <p:nvPicPr>
-          <p:cNvPr id="16" name="Picture 15">
-            <a:extLst>
-              <a:ext uri="{FF2B5EF4-FFF2-40B4-BE49-F238E27FC236}">
-                <a16:creationId xmlns:a16="http://schemas.microsoft.com/office/drawing/2014/main" id="{C93C8A86-9534-438A-8B2A-98FC34D08A67}"/>
+          <p:cNvPr id="3" name="Picture 2">
+            <a:extLst>
+              <a:ext uri="{FF2B5EF4-FFF2-40B4-BE49-F238E27FC236}">
+                <a16:creationId xmlns:a16="http://schemas.microsoft.com/office/drawing/2014/main" id="{361FC9B2-2E99-445D-A95F-3735E72D07CE}"/>
               </a:ext>
             </a:extLst>
           </p:cNvPr>
@@ -3349,8 +3354,8 @@
         </p:blipFill>
         <p:spPr>
           <a:xfrm>
-            <a:off x="4438052" y="2092154"/>
-            <a:ext cx="3068268" cy="2429046"/>
+            <a:off x="4375345" y="2201222"/>
+            <a:ext cx="3049420" cy="2238698"/>
           </a:xfrm>
           <a:prstGeom prst="rect">
             <a:avLst/>
@@ -3662,46 +3667,275 @@
           <a:chExt cx="0" cy="0"/>
         </a:xfrm>
       </p:grpSpPr>
-      <p:pic>
-        <p:nvPicPr>
-          <p:cNvPr id="4" name="Picture 3" descr="Diagram&#10;&#10;Description automatically generated">
-            <a:extLst>
-              <a:ext uri="{FF2B5EF4-FFF2-40B4-BE49-F238E27FC236}">
-                <a16:creationId xmlns:a16="http://schemas.microsoft.com/office/drawing/2014/main" id="{E81D9A8C-A204-4266-80DD-8B1DB4491A88}"/>
-              </a:ext>
-            </a:extLst>
-          </p:cNvPr>
-          <p:cNvPicPr/>
-          <p:nvPr/>
-        </p:nvPicPr>
-        <p:blipFill>
-          <a:blip r:embed="rId2">
-            <a:extLst>
-              <a:ext uri="{28A0092B-C50C-407E-A947-70E740481C1C}">
-                <a14:useLocalDpi xmlns:a14="http://schemas.microsoft.com/office/drawing/2010/main" val="0"/>
-              </a:ext>
-            </a:extLst>
-          </a:blip>
-          <a:stretch>
-            <a:fillRect/>
-          </a:stretch>
-        </p:blipFill>
+      <p:sp>
+        <p:nvSpPr>
+          <p:cNvPr id="14" name="TextBox 13">
+            <a:extLst>
+              <a:ext uri="{FF2B5EF4-FFF2-40B4-BE49-F238E27FC236}">
+                <a16:creationId xmlns:a16="http://schemas.microsoft.com/office/drawing/2014/main" id="{065D2DC1-2350-415F-BA7B-317308A073A6}"/>
+              </a:ext>
+            </a:extLst>
+          </p:cNvPr>
+          <p:cNvSpPr txBox="1"/>
+          <p:nvPr/>
+        </p:nvSpPr>
         <p:spPr>
           <a:xfrm>
-            <a:off x="8509000" y="1034340"/>
-            <a:ext cx="3683000" cy="2576830"/>
+            <a:off x="2944104" y="1042738"/>
+            <a:ext cx="4330720" cy="369332"/>
           </a:xfrm>
           <a:prstGeom prst="rect">
             <a:avLst/>
           </a:prstGeom>
-        </p:spPr>
-      </p:pic>
+          <a:noFill/>
+        </p:spPr>
+        <p:txBody>
+          <a:bodyPr wrap="square" rtlCol="0">
+            <a:spAutoFit/>
+          </a:bodyPr>
+          <a:lstStyle/>
+          <a:p>
+            <a:r>
+              <a:rPr lang="en-US" dirty="0"/>
+              <a:t>Main processor data path &amp; control block</a:t>
+            </a:r>
+          </a:p>
+        </p:txBody>
+      </p:sp>
+      <p:sp>
+        <p:nvSpPr>
+          <p:cNvPr id="47" name="Rectangle 46">
+            <a:extLst>
+              <a:ext uri="{FF2B5EF4-FFF2-40B4-BE49-F238E27FC236}">
+                <a16:creationId xmlns:a16="http://schemas.microsoft.com/office/drawing/2014/main" id="{0A4372B2-BD5E-4F15-B2AF-9710334D3FBF}"/>
+              </a:ext>
+            </a:extLst>
+          </p:cNvPr>
+          <p:cNvSpPr/>
+          <p:nvPr/>
+        </p:nvSpPr>
+        <p:spPr>
+          <a:xfrm>
+            <a:off x="2543753" y="1751340"/>
+            <a:ext cx="5149594" cy="3215296"/>
+          </a:xfrm>
+          <a:prstGeom prst="rect">
+            <a:avLst/>
+          </a:prstGeom>
+          <a:noFill/>
+          <a:ln w="28575">
+            <a:solidFill>
+              <a:schemeClr val="tx1"/>
+            </a:solidFill>
+          </a:ln>
+        </p:spPr>
+        <p:style>
+          <a:lnRef idx="2">
+            <a:schemeClr val="accent1">
+              <a:shade val="50000"/>
+            </a:schemeClr>
+          </a:lnRef>
+          <a:fillRef idx="1">
+            <a:schemeClr val="accent1"/>
+          </a:fillRef>
+          <a:effectRef idx="0">
+            <a:schemeClr val="accent1"/>
+          </a:effectRef>
+          <a:fontRef idx="minor">
+            <a:schemeClr val="lt1"/>
+          </a:fontRef>
+        </p:style>
+        <p:txBody>
+          <a:bodyPr rtlCol="0" anchor="ctr"/>
+          <a:lstStyle/>
+          <a:p>
+            <a:pPr algn="ctr"/>
+            <a:endParaRPr lang="en-US"/>
+          </a:p>
+        </p:txBody>
+      </p:sp>
+      <p:sp>
+        <p:nvSpPr>
+          <p:cNvPr id="74" name="TextBox 73">
+            <a:extLst>
+              <a:ext uri="{FF2B5EF4-FFF2-40B4-BE49-F238E27FC236}">
+                <a16:creationId xmlns:a16="http://schemas.microsoft.com/office/drawing/2014/main" id="{1558250A-F2E1-493F-AE92-85305D710B9E}"/>
+              </a:ext>
+            </a:extLst>
+          </p:cNvPr>
+          <p:cNvSpPr txBox="1"/>
+          <p:nvPr/>
+        </p:nvSpPr>
+        <p:spPr>
+          <a:xfrm>
+            <a:off x="4143248" y="2484925"/>
+            <a:ext cx="1932432" cy="369332"/>
+          </a:xfrm>
+          <a:prstGeom prst="rect">
+            <a:avLst/>
+          </a:prstGeom>
+          <a:noFill/>
+        </p:spPr>
+        <p:txBody>
+          <a:bodyPr wrap="square" rtlCol="0">
+            <a:spAutoFit/>
+          </a:bodyPr>
+          <a:lstStyle/>
+          <a:p>
+            <a:pPr algn="ctr"/>
+            <a:r>
+              <a:rPr lang="en-US" dirty="0"/>
+              <a:t>Data Path</a:t>
+            </a:r>
+          </a:p>
+        </p:txBody>
+      </p:sp>
+      <p:sp>
+        <p:nvSpPr>
+          <p:cNvPr id="75" name="Rectangle 74">
+            <a:extLst>
+              <a:ext uri="{FF2B5EF4-FFF2-40B4-BE49-F238E27FC236}">
+                <a16:creationId xmlns:a16="http://schemas.microsoft.com/office/drawing/2014/main" id="{19C8C219-F673-477D-8318-0C00ADE11EE7}"/>
+              </a:ext>
+            </a:extLst>
+          </p:cNvPr>
+          <p:cNvSpPr/>
+          <p:nvPr/>
+        </p:nvSpPr>
+        <p:spPr>
+          <a:xfrm>
+            <a:off x="3241356" y="2105635"/>
+            <a:ext cx="3787019" cy="1127912"/>
+          </a:xfrm>
+          <a:prstGeom prst="rect">
+            <a:avLst/>
+          </a:prstGeom>
+          <a:noFill/>
+          <a:ln w="19050">
+            <a:solidFill>
+              <a:schemeClr val="tx1"/>
+            </a:solidFill>
+          </a:ln>
+        </p:spPr>
+        <p:style>
+          <a:lnRef idx="2">
+            <a:schemeClr val="accent1">
+              <a:shade val="50000"/>
+            </a:schemeClr>
+          </a:lnRef>
+          <a:fillRef idx="1">
+            <a:schemeClr val="accent1"/>
+          </a:fillRef>
+          <a:effectRef idx="0">
+            <a:schemeClr val="accent1"/>
+          </a:effectRef>
+          <a:fontRef idx="minor">
+            <a:schemeClr val="lt1"/>
+          </a:fontRef>
+        </p:style>
+        <p:txBody>
+          <a:bodyPr rtlCol="0" anchor="ctr"/>
+          <a:lstStyle/>
+          <a:p>
+            <a:pPr algn="ctr"/>
+            <a:endParaRPr lang="en-US"/>
+          </a:p>
+        </p:txBody>
+      </p:sp>
+      <p:sp>
+        <p:nvSpPr>
+          <p:cNvPr id="76" name="TextBox 75">
+            <a:extLst>
+              <a:ext uri="{FF2B5EF4-FFF2-40B4-BE49-F238E27FC236}">
+                <a16:creationId xmlns:a16="http://schemas.microsoft.com/office/drawing/2014/main" id="{974333F6-0AC2-48EB-A992-446AAEDE8A73}"/>
+              </a:ext>
+            </a:extLst>
+          </p:cNvPr>
+          <p:cNvSpPr txBox="1"/>
+          <p:nvPr/>
+        </p:nvSpPr>
+        <p:spPr>
+          <a:xfrm>
+            <a:off x="3083560" y="4021247"/>
+            <a:ext cx="1932432" cy="369332"/>
+          </a:xfrm>
+          <a:prstGeom prst="rect">
+            <a:avLst/>
+          </a:prstGeom>
+          <a:noFill/>
+        </p:spPr>
+        <p:txBody>
+          <a:bodyPr wrap="square" rtlCol="0">
+            <a:spAutoFit/>
+          </a:bodyPr>
+          <a:lstStyle/>
+          <a:p>
+            <a:pPr algn="ctr"/>
+            <a:r>
+              <a:rPr lang="en-US" dirty="0"/>
+              <a:t>Control unit</a:t>
+            </a:r>
+          </a:p>
+        </p:txBody>
+      </p:sp>
+      <p:sp>
+        <p:nvSpPr>
+          <p:cNvPr id="77" name="Rectangle: Rounded Corners 76">
+            <a:extLst>
+              <a:ext uri="{FF2B5EF4-FFF2-40B4-BE49-F238E27FC236}">
+                <a16:creationId xmlns:a16="http://schemas.microsoft.com/office/drawing/2014/main" id="{FCE4DE33-7B45-4E0B-8E94-9B60A44FBD1B}"/>
+              </a:ext>
+            </a:extLst>
+          </p:cNvPr>
+          <p:cNvSpPr/>
+          <p:nvPr/>
+        </p:nvSpPr>
+        <p:spPr>
+          <a:xfrm>
+            <a:off x="3240690" y="3897051"/>
+            <a:ext cx="1618172" cy="617723"/>
+          </a:xfrm>
+          <a:prstGeom prst="roundRect">
+            <a:avLst/>
+          </a:prstGeom>
+          <a:noFill/>
+          <a:ln w="19050">
+            <a:solidFill>
+              <a:schemeClr val="tx1"/>
+            </a:solidFill>
+          </a:ln>
+        </p:spPr>
+        <p:style>
+          <a:lnRef idx="2">
+            <a:schemeClr val="accent1">
+              <a:shade val="50000"/>
+            </a:schemeClr>
+          </a:lnRef>
+          <a:fillRef idx="1">
+            <a:schemeClr val="accent1"/>
+          </a:fillRef>
+          <a:effectRef idx="0">
+            <a:schemeClr val="accent1"/>
+          </a:effectRef>
+          <a:fontRef idx="minor">
+            <a:schemeClr val="lt1"/>
+          </a:fontRef>
+        </p:style>
+        <p:txBody>
+          <a:bodyPr rtlCol="0" anchor="ctr"/>
+          <a:lstStyle/>
+          <a:p>
+            <a:pPr algn="ctr"/>
+            <a:endParaRPr lang="en-US"/>
+          </a:p>
+        </p:txBody>
+      </p:sp>
       <p:cxnSp>
         <p:nvCxnSpPr>
-          <p:cNvPr id="6" name="Straight Connector 5">
-            <a:extLst>
-              <a:ext uri="{FF2B5EF4-FFF2-40B4-BE49-F238E27FC236}">
-                <a16:creationId xmlns:a16="http://schemas.microsoft.com/office/drawing/2014/main" id="{AD49E92C-7697-4A21-A574-A8BC37DECF52}"/>
+          <p:cNvPr id="51" name="Straight Connector 50">
+            <a:extLst>
+              <a:ext uri="{FF2B5EF4-FFF2-40B4-BE49-F238E27FC236}">
+                <a16:creationId xmlns:a16="http://schemas.microsoft.com/office/drawing/2014/main" id="{183295E3-F5C5-4EA5-8B22-833ED58535EE}"/>
               </a:ext>
             </a:extLst>
           </p:cNvPr>
@@ -3712,13 +3946,17 @@
         </p:nvCxnSpPr>
         <p:spPr>
           <a:xfrm flipH="1">
-            <a:off x="9104764" y="1761744"/>
+            <a:off x="2253102" y="2218152"/>
             <a:ext cx="97536" cy="195072"/>
           </a:xfrm>
           <a:prstGeom prst="line">
             <a:avLst/>
           </a:prstGeom>
-          <a:ln w="12700"/>
+          <a:ln w="12700">
+            <a:solidFill>
+              <a:schemeClr val="tx1"/>
+            </a:solidFill>
+          </a:ln>
         </p:spPr>
         <p:style>
           <a:lnRef idx="1">
@@ -3737,10 +3975,10 @@
       </p:cxnSp>
       <p:sp>
         <p:nvSpPr>
-          <p:cNvPr id="8" name="TextBox 7">
-            <a:extLst>
-              <a:ext uri="{FF2B5EF4-FFF2-40B4-BE49-F238E27FC236}">
-                <a16:creationId xmlns:a16="http://schemas.microsoft.com/office/drawing/2014/main" id="{A0DBFDC5-9F84-4D8E-BB45-12156A324643}"/>
+          <p:cNvPr id="52" name="TextBox 51">
+            <a:extLst>
+              <a:ext uri="{FF2B5EF4-FFF2-40B4-BE49-F238E27FC236}">
+                <a16:creationId xmlns:a16="http://schemas.microsoft.com/office/drawing/2014/main" id="{766567FD-C86C-49F5-A5C5-4CDD87D473C1}"/>
               </a:ext>
             </a:extLst>
           </p:cNvPr>
@@ -3749,8 +3987,8 @@
         </p:nvSpPr>
         <p:spPr>
           <a:xfrm>
-            <a:off x="8982844" y="1649227"/>
-            <a:ext cx="207264" cy="261610"/>
+            <a:off x="2098670" y="2069602"/>
+            <a:ext cx="207264" cy="307777"/>
           </a:xfrm>
           <a:prstGeom prst="rect">
             <a:avLst/>
@@ -3764,10 +4002,11 @@
           <a:lstStyle/>
           <a:p>
             <a:r>
-              <a:rPr lang="en-US" sz="1100" dirty="0">
+              <a:rPr lang="en-US" sz="1400" dirty="0">
                 <a:solidFill>
-                  <a:schemeClr val="accent1">
-                    <a:lumMod val="75000"/>
+                  <a:schemeClr val="tx1">
+                    <a:lumMod val="85000"/>
+                    <a:lumOff val="15000"/>
                   </a:schemeClr>
                 </a:solidFill>
               </a:rPr>
@@ -3778,10 +4017,10 @@
       </p:sp>
       <p:cxnSp>
         <p:nvCxnSpPr>
-          <p:cNvPr id="10" name="Straight Connector 9">
-            <a:extLst>
-              <a:ext uri="{FF2B5EF4-FFF2-40B4-BE49-F238E27FC236}">
-                <a16:creationId xmlns:a16="http://schemas.microsoft.com/office/drawing/2014/main" id="{C3B12962-9B23-4080-B41D-4C3CAE267D12}"/>
+          <p:cNvPr id="53" name="Straight Connector 52">
+            <a:extLst>
+              <a:ext uri="{FF2B5EF4-FFF2-40B4-BE49-F238E27FC236}">
+                <a16:creationId xmlns:a16="http://schemas.microsoft.com/office/drawing/2014/main" id="{D96F1ABB-7B2D-4E8F-9D3B-2C0E47693D60}"/>
               </a:ext>
             </a:extLst>
           </p:cNvPr>
@@ -3792,13 +4031,19 @@
         </p:nvCxnSpPr>
         <p:spPr>
           <a:xfrm flipH="1">
-            <a:off x="11444104" y="1754368"/>
-            <a:ext cx="97536" cy="195072"/>
+            <a:off x="2067174" y="2317082"/>
+            <a:ext cx="487680" cy="0"/>
           </a:xfrm>
           <a:prstGeom prst="line">
             <a:avLst/>
           </a:prstGeom>
-          <a:ln w="12700"/>
+          <a:ln w="28575">
+            <a:solidFill>
+              <a:schemeClr val="tx1"/>
+            </a:solidFill>
+            <a:headEnd type="triangle"/>
+            <a:tailEnd type="none"/>
+          </a:ln>
         </p:spPr>
         <p:style>
           <a:lnRef idx="1">
@@ -3817,10 +4062,10 @@
       </p:cxnSp>
       <p:sp>
         <p:nvSpPr>
-          <p:cNvPr id="11" name="TextBox 10">
-            <a:extLst>
-              <a:ext uri="{FF2B5EF4-FFF2-40B4-BE49-F238E27FC236}">
-                <a16:creationId xmlns:a16="http://schemas.microsoft.com/office/drawing/2014/main" id="{B3262F02-9596-465F-BEF4-8F0CDCF24034}"/>
+          <p:cNvPr id="54" name="TextBox 53">
+            <a:extLst>
+              <a:ext uri="{FF2B5EF4-FFF2-40B4-BE49-F238E27FC236}">
+                <a16:creationId xmlns:a16="http://schemas.microsoft.com/office/drawing/2014/main" id="{632BD3CD-F874-4CE9-B0AE-0905A70E1CCC}"/>
               </a:ext>
             </a:extLst>
           </p:cNvPr>
@@ -3829,8 +4074,8 @@
         </p:nvSpPr>
         <p:spPr>
           <a:xfrm>
-            <a:off x="11322184" y="1641851"/>
-            <a:ext cx="207264" cy="261610"/>
+            <a:off x="1525875" y="2146385"/>
+            <a:ext cx="593115" cy="276999"/>
           </a:xfrm>
           <a:prstGeom prst="rect">
             <a:avLst/>
@@ -3844,24 +4089,19 @@
           <a:lstStyle/>
           <a:p>
             <a:r>
-              <a:rPr lang="en-US" sz="1100" dirty="0">
-                <a:solidFill>
-                  <a:schemeClr val="accent1">
-                    <a:lumMod val="75000"/>
-                  </a:schemeClr>
-                </a:solidFill>
-              </a:rPr>
-              <a:t>8</a:t>
-            </a:r>
+              <a:rPr lang="en-US" sz="1200" b="1" dirty="0" err="1"/>
+              <a:t>dataIn</a:t>
+            </a:r>
+            <a:endParaRPr lang="en-US" sz="1200" b="1" dirty="0"/>
           </a:p>
         </p:txBody>
       </p:sp>
       <p:cxnSp>
         <p:nvCxnSpPr>
-          <p:cNvPr id="12" name="Straight Connector 11">
-            <a:extLst>
-              <a:ext uri="{FF2B5EF4-FFF2-40B4-BE49-F238E27FC236}">
-                <a16:creationId xmlns:a16="http://schemas.microsoft.com/office/drawing/2014/main" id="{7D5FBC6E-F242-42A5-BD0B-36EE8931B535}"/>
+          <p:cNvPr id="55" name="Straight Connector 54">
+            <a:extLst>
+              <a:ext uri="{FF2B5EF4-FFF2-40B4-BE49-F238E27FC236}">
+                <a16:creationId xmlns:a16="http://schemas.microsoft.com/office/drawing/2014/main" id="{726AF113-0D76-41EC-BB1E-3C59DD6E5025}"/>
               </a:ext>
             </a:extLst>
           </p:cNvPr>
@@ -3872,13 +4112,18 @@
         </p:nvCxnSpPr>
         <p:spPr>
           <a:xfrm flipH="1">
-            <a:off x="9104764" y="2105635"/>
-            <a:ext cx="97536" cy="195072"/>
+            <a:off x="2543753" y="2312595"/>
+            <a:ext cx="696937" cy="0"/>
           </a:xfrm>
           <a:prstGeom prst="line">
             <a:avLst/>
           </a:prstGeom>
-          <a:ln w="12700"/>
+          <a:ln w="19050">
+            <a:solidFill>
+              <a:schemeClr val="tx1"/>
+            </a:solidFill>
+            <a:prstDash val="sysDash"/>
+          </a:ln>
         </p:spPr>
         <p:style>
           <a:lnRef idx="1">
@@ -3895,88 +4140,12 @@
           </a:fontRef>
         </p:style>
       </p:cxnSp>
-      <p:sp>
-        <p:nvSpPr>
-          <p:cNvPr id="13" name="TextBox 12">
-            <a:extLst>
-              <a:ext uri="{FF2B5EF4-FFF2-40B4-BE49-F238E27FC236}">
-                <a16:creationId xmlns:a16="http://schemas.microsoft.com/office/drawing/2014/main" id="{15316C5B-3260-4F38-A8B9-39690B9A4732}"/>
-              </a:ext>
-            </a:extLst>
-          </p:cNvPr>
-          <p:cNvSpPr txBox="1"/>
-          <p:nvPr/>
-        </p:nvSpPr>
-        <p:spPr>
-          <a:xfrm>
-            <a:off x="8982844" y="1993118"/>
-            <a:ext cx="207264" cy="261610"/>
-          </a:xfrm>
-          <a:prstGeom prst="rect">
-            <a:avLst/>
-          </a:prstGeom>
-          <a:noFill/>
-        </p:spPr>
-        <p:txBody>
-          <a:bodyPr wrap="square" rtlCol="0">
-            <a:spAutoFit/>
-          </a:bodyPr>
-          <a:lstStyle/>
-          <a:p>
-            <a:r>
-              <a:rPr lang="en-US" sz="1100" dirty="0">
-                <a:solidFill>
-                  <a:schemeClr val="accent1">
-                    <a:lumMod val="75000"/>
-                  </a:schemeClr>
-                </a:solidFill>
-              </a:rPr>
-              <a:t>9</a:t>
-            </a:r>
-          </a:p>
-        </p:txBody>
-      </p:sp>
-      <p:sp>
-        <p:nvSpPr>
-          <p:cNvPr id="14" name="TextBox 13">
-            <a:extLst>
-              <a:ext uri="{FF2B5EF4-FFF2-40B4-BE49-F238E27FC236}">
-                <a16:creationId xmlns:a16="http://schemas.microsoft.com/office/drawing/2014/main" id="{065D2DC1-2350-415F-BA7B-317308A073A6}"/>
-              </a:ext>
-            </a:extLst>
-          </p:cNvPr>
-          <p:cNvSpPr txBox="1"/>
-          <p:nvPr/>
-        </p:nvSpPr>
-        <p:spPr>
-          <a:xfrm>
-            <a:off x="9384284" y="361253"/>
-            <a:ext cx="1932432" cy="369332"/>
-          </a:xfrm>
-          <a:prstGeom prst="rect">
-            <a:avLst/>
-          </a:prstGeom>
-          <a:noFill/>
-        </p:spPr>
-        <p:txBody>
-          <a:bodyPr wrap="square" rtlCol="0">
-            <a:spAutoFit/>
-          </a:bodyPr>
-          <a:lstStyle/>
-          <a:p>
-            <a:r>
-              <a:rPr lang="en-US" dirty="0"/>
-              <a:t>Main processor </a:t>
-            </a:r>
-          </a:p>
-        </p:txBody>
-      </p:sp>
       <p:cxnSp>
         <p:nvCxnSpPr>
-          <p:cNvPr id="15" name="Straight Connector 14">
-            <a:extLst>
-              <a:ext uri="{FF2B5EF4-FFF2-40B4-BE49-F238E27FC236}">
-                <a16:creationId xmlns:a16="http://schemas.microsoft.com/office/drawing/2014/main" id="{F6C4B80C-968F-4C28-931C-047E310F6934}"/>
+          <p:cNvPr id="57" name="Straight Connector 56">
+            <a:extLst>
+              <a:ext uri="{FF2B5EF4-FFF2-40B4-BE49-F238E27FC236}">
+                <a16:creationId xmlns:a16="http://schemas.microsoft.com/office/drawing/2014/main" id="{2EFB1EF8-2706-4C0E-8986-AC43DBAF4C34}"/>
               </a:ext>
             </a:extLst>
           </p:cNvPr>
@@ -3987,7 +4156,7 @@
         </p:nvCxnSpPr>
         <p:spPr>
           <a:xfrm flipH="1">
-            <a:off x="9226684" y="4565969"/>
+            <a:off x="2253192" y="3029116"/>
             <a:ext cx="97536" cy="195072"/>
           </a:xfrm>
           <a:prstGeom prst="line">
@@ -4016,10 +4185,10 @@
       </p:cxnSp>
       <p:sp>
         <p:nvSpPr>
-          <p:cNvPr id="16" name="TextBox 15">
-            <a:extLst>
-              <a:ext uri="{FF2B5EF4-FFF2-40B4-BE49-F238E27FC236}">
-                <a16:creationId xmlns:a16="http://schemas.microsoft.com/office/drawing/2014/main" id="{5DC04EA3-F345-4629-84C2-2C63E7B70733}"/>
+          <p:cNvPr id="58" name="TextBox 57">
+            <a:extLst>
+              <a:ext uri="{FF2B5EF4-FFF2-40B4-BE49-F238E27FC236}">
+                <a16:creationId xmlns:a16="http://schemas.microsoft.com/office/drawing/2014/main" id="{387705FA-C215-42D6-BA42-8CA2BA6CCC02}"/>
               </a:ext>
             </a:extLst>
           </p:cNvPr>
@@ -4028,8 +4197,8 @@
         </p:nvSpPr>
         <p:spPr>
           <a:xfrm>
-            <a:off x="9104764" y="4453452"/>
-            <a:ext cx="207264" cy="261610"/>
+            <a:off x="2098760" y="2880566"/>
+            <a:ext cx="207264" cy="307777"/>
           </a:xfrm>
           <a:prstGeom prst="rect">
             <a:avLst/>
@@ -4043,7 +4212,348 @@
           <a:lstStyle/>
           <a:p>
             <a:r>
-              <a:rPr lang="en-US" sz="1100" dirty="0">
+              <a:rPr lang="en-US" sz="1400" dirty="0">
+                <a:solidFill>
+                  <a:schemeClr val="tx1">
+                    <a:lumMod val="85000"/>
+                    <a:lumOff val="15000"/>
+                  </a:schemeClr>
+                </a:solidFill>
+              </a:rPr>
+              <a:t>9</a:t>
+            </a:r>
+          </a:p>
+        </p:txBody>
+      </p:sp>
+      <p:cxnSp>
+        <p:nvCxnSpPr>
+          <p:cNvPr id="59" name="Straight Connector 58">
+            <a:extLst>
+              <a:ext uri="{FF2B5EF4-FFF2-40B4-BE49-F238E27FC236}">
+                <a16:creationId xmlns:a16="http://schemas.microsoft.com/office/drawing/2014/main" id="{7A15D9D5-DCE6-4EBD-839F-9C1A8DCEAB6F}"/>
+              </a:ext>
+            </a:extLst>
+          </p:cNvPr>
+          <p:cNvCxnSpPr>
+            <a:cxnSpLocks/>
+          </p:cNvCxnSpPr>
+          <p:nvPr/>
+        </p:nvCxnSpPr>
+        <p:spPr>
+          <a:xfrm flipH="1">
+            <a:off x="2067264" y="3117886"/>
+            <a:ext cx="487680" cy="0"/>
+          </a:xfrm>
+          <a:prstGeom prst="line">
+            <a:avLst/>
+          </a:prstGeom>
+          <a:ln w="28575">
+            <a:solidFill>
+              <a:schemeClr val="tx1"/>
+            </a:solidFill>
+            <a:headEnd type="triangle"/>
+            <a:tailEnd type="none"/>
+          </a:ln>
+        </p:spPr>
+        <p:style>
+          <a:lnRef idx="1">
+            <a:schemeClr val="accent1"/>
+          </a:lnRef>
+          <a:fillRef idx="0">
+            <a:schemeClr val="accent1"/>
+          </a:fillRef>
+          <a:effectRef idx="0">
+            <a:schemeClr val="accent1"/>
+          </a:effectRef>
+          <a:fontRef idx="minor">
+            <a:schemeClr val="tx1"/>
+          </a:fontRef>
+        </p:style>
+      </p:cxnSp>
+      <p:sp>
+        <p:nvSpPr>
+          <p:cNvPr id="60" name="TextBox 59">
+            <a:extLst>
+              <a:ext uri="{FF2B5EF4-FFF2-40B4-BE49-F238E27FC236}">
+                <a16:creationId xmlns:a16="http://schemas.microsoft.com/office/drawing/2014/main" id="{2CF2DD01-18E2-4C09-9076-2DACAF0DDF7F}"/>
+              </a:ext>
+            </a:extLst>
+          </p:cNvPr>
+          <p:cNvSpPr txBox="1"/>
+          <p:nvPr/>
+        </p:nvSpPr>
+        <p:spPr>
+          <a:xfrm>
+            <a:off x="1402293" y="2957349"/>
+            <a:ext cx="716788" cy="276999"/>
+          </a:xfrm>
+          <a:prstGeom prst="rect">
+            <a:avLst/>
+          </a:prstGeom>
+          <a:noFill/>
+        </p:spPr>
+        <p:txBody>
+          <a:bodyPr wrap="square" rtlCol="0">
+            <a:spAutoFit/>
+          </a:bodyPr>
+          <a:lstStyle/>
+          <a:p>
+            <a:r>
+              <a:rPr lang="en-US" sz="1200" b="1" dirty="0"/>
+              <a:t>function</a:t>
+            </a:r>
+          </a:p>
+        </p:txBody>
+      </p:sp>
+      <p:cxnSp>
+        <p:nvCxnSpPr>
+          <p:cNvPr id="61" name="Straight Connector 60">
+            <a:extLst>
+              <a:ext uri="{FF2B5EF4-FFF2-40B4-BE49-F238E27FC236}">
+                <a16:creationId xmlns:a16="http://schemas.microsoft.com/office/drawing/2014/main" id="{29F4E14B-8186-4B99-96F8-7075D768198D}"/>
+              </a:ext>
+            </a:extLst>
+          </p:cNvPr>
+          <p:cNvCxnSpPr>
+            <a:cxnSpLocks/>
+          </p:cNvCxnSpPr>
+          <p:nvPr/>
+        </p:nvCxnSpPr>
+        <p:spPr>
+          <a:xfrm flipH="1">
+            <a:off x="2543753" y="3133066"/>
+            <a:ext cx="348469" cy="0"/>
+          </a:xfrm>
+          <a:prstGeom prst="line">
+            <a:avLst/>
+          </a:prstGeom>
+          <a:ln w="19050">
+            <a:solidFill>
+              <a:schemeClr val="tx1"/>
+            </a:solidFill>
+            <a:prstDash val="sysDash"/>
+          </a:ln>
+        </p:spPr>
+        <p:style>
+          <a:lnRef idx="1">
+            <a:schemeClr val="accent1"/>
+          </a:lnRef>
+          <a:fillRef idx="0">
+            <a:schemeClr val="accent1"/>
+          </a:fillRef>
+          <a:effectRef idx="0">
+            <a:schemeClr val="accent1"/>
+          </a:effectRef>
+          <a:fontRef idx="minor">
+            <a:schemeClr val="tx1"/>
+          </a:fontRef>
+        </p:style>
+      </p:cxnSp>
+      <p:cxnSp>
+        <p:nvCxnSpPr>
+          <p:cNvPr id="62" name="Straight Connector 61">
+            <a:extLst>
+              <a:ext uri="{FF2B5EF4-FFF2-40B4-BE49-F238E27FC236}">
+                <a16:creationId xmlns:a16="http://schemas.microsoft.com/office/drawing/2014/main" id="{DA9FC520-CC5E-4238-9697-B8BE86E264E1}"/>
+              </a:ext>
+            </a:extLst>
+          </p:cNvPr>
+          <p:cNvCxnSpPr>
+            <a:cxnSpLocks/>
+          </p:cNvCxnSpPr>
+          <p:nvPr/>
+        </p:nvCxnSpPr>
+        <p:spPr>
+          <a:xfrm flipV="1">
+            <a:off x="2892221" y="2791741"/>
+            <a:ext cx="0" cy="1414171"/>
+          </a:xfrm>
+          <a:prstGeom prst="line">
+            <a:avLst/>
+          </a:prstGeom>
+          <a:ln w="19050">
+            <a:solidFill>
+              <a:schemeClr val="tx1"/>
+            </a:solidFill>
+            <a:prstDash val="sysDash"/>
+          </a:ln>
+        </p:spPr>
+        <p:style>
+          <a:lnRef idx="1">
+            <a:schemeClr val="accent1"/>
+          </a:lnRef>
+          <a:fillRef idx="0">
+            <a:schemeClr val="accent1"/>
+          </a:fillRef>
+          <a:effectRef idx="0">
+            <a:schemeClr val="accent1"/>
+          </a:effectRef>
+          <a:fontRef idx="minor">
+            <a:schemeClr val="tx1"/>
+          </a:fontRef>
+        </p:style>
+      </p:cxnSp>
+      <p:cxnSp>
+        <p:nvCxnSpPr>
+          <p:cNvPr id="66" name="Straight Connector 65">
+            <a:extLst>
+              <a:ext uri="{FF2B5EF4-FFF2-40B4-BE49-F238E27FC236}">
+                <a16:creationId xmlns:a16="http://schemas.microsoft.com/office/drawing/2014/main" id="{144264E7-C1B8-4EE8-8785-858FAC6A1FD7}"/>
+              </a:ext>
+            </a:extLst>
+          </p:cNvPr>
+          <p:cNvCxnSpPr>
+            <a:cxnSpLocks/>
+          </p:cNvCxnSpPr>
+          <p:nvPr/>
+        </p:nvCxnSpPr>
+        <p:spPr>
+          <a:xfrm flipV="1">
+            <a:off x="2883750" y="2794036"/>
+            <a:ext cx="356940" cy="1"/>
+          </a:xfrm>
+          <a:prstGeom prst="line">
+            <a:avLst/>
+          </a:prstGeom>
+          <a:ln w="19050">
+            <a:solidFill>
+              <a:schemeClr val="tx1"/>
+            </a:solidFill>
+            <a:prstDash val="sysDash"/>
+          </a:ln>
+        </p:spPr>
+        <p:style>
+          <a:lnRef idx="1">
+            <a:schemeClr val="accent1"/>
+          </a:lnRef>
+          <a:fillRef idx="0">
+            <a:schemeClr val="accent1"/>
+          </a:fillRef>
+          <a:effectRef idx="0">
+            <a:schemeClr val="accent1"/>
+          </a:effectRef>
+          <a:fontRef idx="minor">
+            <a:schemeClr val="tx1"/>
+          </a:fontRef>
+        </p:style>
+      </p:cxnSp>
+      <p:cxnSp>
+        <p:nvCxnSpPr>
+          <p:cNvPr id="69" name="Straight Connector 68">
+            <a:extLst>
+              <a:ext uri="{FF2B5EF4-FFF2-40B4-BE49-F238E27FC236}">
+                <a16:creationId xmlns:a16="http://schemas.microsoft.com/office/drawing/2014/main" id="{EA6519B5-C672-4079-8CB5-1E0BF9849012}"/>
+              </a:ext>
+            </a:extLst>
+          </p:cNvPr>
+          <p:cNvCxnSpPr>
+            <a:cxnSpLocks/>
+          </p:cNvCxnSpPr>
+          <p:nvPr/>
+        </p:nvCxnSpPr>
+        <p:spPr>
+          <a:xfrm flipV="1">
+            <a:off x="2892221" y="4195872"/>
+            <a:ext cx="356940" cy="1"/>
+          </a:xfrm>
+          <a:prstGeom prst="line">
+            <a:avLst/>
+          </a:prstGeom>
+          <a:ln w="19050">
+            <a:solidFill>
+              <a:schemeClr val="tx1"/>
+            </a:solidFill>
+            <a:prstDash val="sysDash"/>
+          </a:ln>
+        </p:spPr>
+        <p:style>
+          <a:lnRef idx="1">
+            <a:schemeClr val="accent1"/>
+          </a:lnRef>
+          <a:fillRef idx="0">
+            <a:schemeClr val="accent1"/>
+          </a:fillRef>
+          <a:effectRef idx="0">
+            <a:schemeClr val="accent1"/>
+          </a:effectRef>
+          <a:fontRef idx="minor">
+            <a:schemeClr val="tx1"/>
+          </a:fontRef>
+        </p:style>
+      </p:cxnSp>
+      <p:cxnSp>
+        <p:nvCxnSpPr>
+          <p:cNvPr id="70" name="Straight Connector 69">
+            <a:extLst>
+              <a:ext uri="{FF2B5EF4-FFF2-40B4-BE49-F238E27FC236}">
+                <a16:creationId xmlns:a16="http://schemas.microsoft.com/office/drawing/2014/main" id="{C26191ED-F1F7-451A-B93F-22A0988CD63A}"/>
+              </a:ext>
+            </a:extLst>
+          </p:cNvPr>
+          <p:cNvCxnSpPr>
+            <a:cxnSpLocks/>
+          </p:cNvCxnSpPr>
+          <p:nvPr/>
+        </p:nvCxnSpPr>
+        <p:spPr>
+          <a:xfrm flipH="1">
+            <a:off x="3026362" y="4090860"/>
+            <a:ext cx="97536" cy="195072"/>
+          </a:xfrm>
+          <a:prstGeom prst="line">
+            <a:avLst/>
+          </a:prstGeom>
+          <a:ln w="12700">
+            <a:solidFill>
+              <a:schemeClr val="tx1"/>
+            </a:solidFill>
+          </a:ln>
+        </p:spPr>
+        <p:style>
+          <a:lnRef idx="1">
+            <a:schemeClr val="accent1"/>
+          </a:lnRef>
+          <a:fillRef idx="0">
+            <a:schemeClr val="accent1"/>
+          </a:fillRef>
+          <a:effectRef idx="0">
+            <a:schemeClr val="accent1"/>
+          </a:effectRef>
+          <a:fontRef idx="minor">
+            <a:schemeClr val="tx1"/>
+          </a:fontRef>
+        </p:style>
+      </p:cxnSp>
+      <p:sp>
+        <p:nvSpPr>
+          <p:cNvPr id="71" name="TextBox 70">
+            <a:extLst>
+              <a:ext uri="{FF2B5EF4-FFF2-40B4-BE49-F238E27FC236}">
+                <a16:creationId xmlns:a16="http://schemas.microsoft.com/office/drawing/2014/main" id="{3077A581-9CD2-4480-B737-66592559FA57}"/>
+              </a:ext>
+            </a:extLst>
+          </p:cNvPr>
+          <p:cNvSpPr txBox="1"/>
+          <p:nvPr/>
+        </p:nvSpPr>
+        <p:spPr>
+          <a:xfrm>
+            <a:off x="2871930" y="3942310"/>
+            <a:ext cx="207264" cy="307777"/>
+          </a:xfrm>
+          <a:prstGeom prst="rect">
+            <a:avLst/>
+          </a:prstGeom>
+          <a:noFill/>
+        </p:spPr>
+        <p:txBody>
+          <a:bodyPr wrap="square" rtlCol="0">
+            <a:spAutoFit/>
+          </a:bodyPr>
+          <a:lstStyle/>
+          <a:p>
+            <a:r>
+              <a:rPr lang="en-US" sz="1400" dirty="0">
                 <a:solidFill>
                   <a:schemeClr val="tx1">
                     <a:lumMod val="85000"/>
@@ -4056,64 +4566,97 @@
           </a:p>
         </p:txBody>
       </p:sp>
-      <p:sp>
-        <p:nvSpPr>
-          <p:cNvPr id="17" name="Rectangle 16">
-            <a:extLst>
-              <a:ext uri="{FF2B5EF4-FFF2-40B4-BE49-F238E27FC236}">
-                <a16:creationId xmlns:a16="http://schemas.microsoft.com/office/drawing/2014/main" id="{023F4C3D-35B4-4636-94CC-B9C022E956A5}"/>
-              </a:ext>
-            </a:extLst>
-          </p:cNvPr>
-          <p:cNvSpPr/>
-          <p:nvPr/>
-        </p:nvSpPr>
-        <p:spPr>
-          <a:xfrm>
-            <a:off x="9522340" y="4390579"/>
-            <a:ext cx="1676400" cy="1828800"/>
-          </a:xfrm>
-          <a:prstGeom prst="rect">
-            <a:avLst/>
-          </a:prstGeom>
-          <a:noFill/>
-          <a:ln>
+      <p:cxnSp>
+        <p:nvCxnSpPr>
+          <p:cNvPr id="72" name="Straight Connector 71">
+            <a:extLst>
+              <a:ext uri="{FF2B5EF4-FFF2-40B4-BE49-F238E27FC236}">
+                <a16:creationId xmlns:a16="http://schemas.microsoft.com/office/drawing/2014/main" id="{F69C3D44-FCBB-4930-BB7D-7D950D290EAB}"/>
+              </a:ext>
+            </a:extLst>
+          </p:cNvPr>
+          <p:cNvCxnSpPr>
+            <a:cxnSpLocks/>
+          </p:cNvCxnSpPr>
+          <p:nvPr/>
+        </p:nvCxnSpPr>
+        <p:spPr>
+          <a:xfrm flipH="1">
+            <a:off x="3037516" y="2675247"/>
+            <a:ext cx="97536" cy="195072"/>
+          </a:xfrm>
+          <a:prstGeom prst="line">
+            <a:avLst/>
+          </a:prstGeom>
+          <a:ln w="12700">
             <a:solidFill>
               <a:schemeClr val="tx1"/>
             </a:solidFill>
           </a:ln>
         </p:spPr>
         <p:style>
-          <a:lnRef idx="2">
-            <a:schemeClr val="accent1">
-              <a:shade val="50000"/>
-            </a:schemeClr>
+          <a:lnRef idx="1">
+            <a:schemeClr val="accent1"/>
           </a:lnRef>
-          <a:fillRef idx="1">
+          <a:fillRef idx="0">
             <a:schemeClr val="accent1"/>
           </a:fillRef>
           <a:effectRef idx="0">
             <a:schemeClr val="accent1"/>
           </a:effectRef>
           <a:fontRef idx="minor">
-            <a:schemeClr val="lt1"/>
+            <a:schemeClr val="tx1"/>
           </a:fontRef>
         </p:style>
-        <p:txBody>
-          <a:bodyPr rtlCol="0" anchor="ctr"/>
-          <a:lstStyle/>
-          <a:p>
-            <a:pPr algn="ctr"/>
-            <a:endParaRPr lang="en-US"/>
+      </p:cxnSp>
+      <p:sp>
+        <p:nvSpPr>
+          <p:cNvPr id="73" name="TextBox 72">
+            <a:extLst>
+              <a:ext uri="{FF2B5EF4-FFF2-40B4-BE49-F238E27FC236}">
+                <a16:creationId xmlns:a16="http://schemas.microsoft.com/office/drawing/2014/main" id="{F63E0442-6B4D-4629-A1C5-638890BA2172}"/>
+              </a:ext>
+            </a:extLst>
+          </p:cNvPr>
+          <p:cNvSpPr txBox="1"/>
+          <p:nvPr/>
+        </p:nvSpPr>
+        <p:spPr>
+          <a:xfrm>
+            <a:off x="2883084" y="2526697"/>
+            <a:ext cx="207264" cy="307777"/>
+          </a:xfrm>
+          <a:prstGeom prst="rect">
+            <a:avLst/>
+          </a:prstGeom>
+          <a:noFill/>
+        </p:spPr>
+        <p:txBody>
+          <a:bodyPr wrap="square" rtlCol="0">
+            <a:spAutoFit/>
+          </a:bodyPr>
+          <a:lstStyle/>
+          <a:p>
+            <a:r>
+              <a:rPr lang="en-US" sz="1400" dirty="0">
+                <a:solidFill>
+                  <a:schemeClr val="tx1">
+                    <a:lumMod val="85000"/>
+                    <a:lumOff val="15000"/>
+                  </a:schemeClr>
+                </a:solidFill>
+              </a:rPr>
+              <a:t>6</a:t>
+            </a:r>
           </a:p>
         </p:txBody>
       </p:sp>
       <p:cxnSp>
         <p:nvCxnSpPr>
-          <p:cNvPr id="18" name="Straight Connector 17">
-            <a:extLst>
-              <a:ext uri="{FF2B5EF4-FFF2-40B4-BE49-F238E27FC236}">
-                <a16:creationId xmlns:a16="http://schemas.microsoft.com/office/drawing/2014/main" id="{082E4C93-BC9D-49CB-A333-561A6B12E387}"/>
+          <p:cNvPr id="79" name="Straight Connector 78">
+            <a:extLst>
+              <a:ext uri="{FF2B5EF4-FFF2-40B4-BE49-F238E27FC236}">
+                <a16:creationId xmlns:a16="http://schemas.microsoft.com/office/drawing/2014/main" id="{378B4F86-070C-4B3A-B84D-E72F7ABE154B}"/>
               </a:ext>
             </a:extLst>
           </p:cNvPr>
@@ -4124,16 +4667,180 @@
         </p:nvCxnSpPr>
         <p:spPr>
           <a:xfrm flipH="1">
-            <a:off x="9040756" y="4664899"/>
+            <a:off x="2056073" y="4812305"/>
             <a:ext cx="487680" cy="0"/>
           </a:xfrm>
           <a:prstGeom prst="line">
             <a:avLst/>
           </a:prstGeom>
-          <a:ln w="28575">
+          <a:ln w="19050">
             <a:solidFill>
               <a:schemeClr val="tx1"/>
             </a:solidFill>
+            <a:headEnd type="triangle"/>
+            <a:tailEnd type="none"/>
+          </a:ln>
+        </p:spPr>
+        <p:style>
+          <a:lnRef idx="1">
+            <a:schemeClr val="accent1"/>
+          </a:lnRef>
+          <a:fillRef idx="0">
+            <a:schemeClr val="accent1"/>
+          </a:fillRef>
+          <a:effectRef idx="0">
+            <a:schemeClr val="accent1"/>
+          </a:effectRef>
+          <a:fontRef idx="minor">
+            <a:schemeClr val="tx1"/>
+          </a:fontRef>
+        </p:style>
+      </p:cxnSp>
+      <p:sp>
+        <p:nvSpPr>
+          <p:cNvPr id="80" name="TextBox 79">
+            <a:extLst>
+              <a:ext uri="{FF2B5EF4-FFF2-40B4-BE49-F238E27FC236}">
+                <a16:creationId xmlns:a16="http://schemas.microsoft.com/office/drawing/2014/main" id="{5C263845-25CB-41B1-8CD1-2E61E71E69F9}"/>
+              </a:ext>
+            </a:extLst>
+          </p:cNvPr>
+          <p:cNvSpPr txBox="1"/>
+          <p:nvPr/>
+        </p:nvSpPr>
+        <p:spPr>
+          <a:xfrm>
+            <a:off x="1606944" y="4664441"/>
+            <a:ext cx="716788" cy="276999"/>
+          </a:xfrm>
+          <a:prstGeom prst="rect">
+            <a:avLst/>
+          </a:prstGeom>
+          <a:noFill/>
+        </p:spPr>
+        <p:txBody>
+          <a:bodyPr wrap="square" rtlCol="0">
+            <a:spAutoFit/>
+          </a:bodyPr>
+          <a:lstStyle/>
+          <a:p>
+            <a:r>
+              <a:rPr lang="en-US" sz="1200" b="1" dirty="0"/>
+              <a:t>clock</a:t>
+            </a:r>
+          </a:p>
+        </p:txBody>
+      </p:sp>
+      <p:cxnSp>
+        <p:nvCxnSpPr>
+          <p:cNvPr id="81" name="Straight Connector 80">
+            <a:extLst>
+              <a:ext uri="{FF2B5EF4-FFF2-40B4-BE49-F238E27FC236}">
+                <a16:creationId xmlns:a16="http://schemas.microsoft.com/office/drawing/2014/main" id="{B2FCD178-7E0F-4325-9BEE-F43B372C2EBF}"/>
+              </a:ext>
+            </a:extLst>
+          </p:cNvPr>
+          <p:cNvCxnSpPr>
+            <a:cxnSpLocks/>
+          </p:cNvCxnSpPr>
+          <p:nvPr/>
+        </p:nvCxnSpPr>
+        <p:spPr>
+          <a:xfrm flipV="1">
+            <a:off x="3836416" y="3233547"/>
+            <a:ext cx="0" cy="673557"/>
+          </a:xfrm>
+          <a:prstGeom prst="line">
+            <a:avLst/>
+          </a:prstGeom>
+          <a:ln w="28575">
+            <a:solidFill>
+              <a:srgbClr val="FF3300"/>
+            </a:solidFill>
+            <a:tailEnd type="triangle"/>
+          </a:ln>
+        </p:spPr>
+        <p:style>
+          <a:lnRef idx="1">
+            <a:schemeClr val="accent1"/>
+          </a:lnRef>
+          <a:fillRef idx="0">
+            <a:schemeClr val="accent1"/>
+          </a:fillRef>
+          <a:effectRef idx="0">
+            <a:schemeClr val="accent1"/>
+          </a:effectRef>
+          <a:fontRef idx="minor">
+            <a:schemeClr val="tx1"/>
+          </a:fontRef>
+        </p:style>
+      </p:cxnSp>
+      <p:sp>
+        <p:nvSpPr>
+          <p:cNvPr id="82" name="TextBox 81">
+            <a:extLst>
+              <a:ext uri="{FF2B5EF4-FFF2-40B4-BE49-F238E27FC236}">
+                <a16:creationId xmlns:a16="http://schemas.microsoft.com/office/drawing/2014/main" id="{2FE89962-0D02-4083-BD53-40F457D4A87E}"/>
+              </a:ext>
+            </a:extLst>
+          </p:cNvPr>
+          <p:cNvSpPr txBox="1"/>
+          <p:nvPr/>
+        </p:nvSpPr>
+        <p:spPr>
+          <a:xfrm>
+            <a:off x="3836416" y="3403693"/>
+            <a:ext cx="716788" cy="461665"/>
+          </a:xfrm>
+          <a:prstGeom prst="rect">
+            <a:avLst/>
+          </a:prstGeom>
+          <a:noFill/>
+        </p:spPr>
+        <p:txBody>
+          <a:bodyPr wrap="square" rtlCol="0">
+            <a:spAutoFit/>
+          </a:bodyPr>
+          <a:lstStyle/>
+          <a:p>
+            <a:r>
+              <a:rPr lang="en-US" sz="1200" b="1" dirty="0">
+                <a:solidFill>
+                  <a:srgbClr val="FF0000"/>
+                </a:solidFill>
+              </a:rPr>
+              <a:t>Control signals</a:t>
+            </a:r>
+          </a:p>
+        </p:txBody>
+      </p:sp>
+      <p:cxnSp>
+        <p:nvCxnSpPr>
+          <p:cNvPr id="88" name="Straight Connector 87">
+            <a:extLst>
+              <a:ext uri="{FF2B5EF4-FFF2-40B4-BE49-F238E27FC236}">
+                <a16:creationId xmlns:a16="http://schemas.microsoft.com/office/drawing/2014/main" id="{9224DCF9-274F-4215-8AAD-0D0F6C4E442C}"/>
+              </a:ext>
+            </a:extLst>
+          </p:cNvPr>
+          <p:cNvCxnSpPr>
+            <a:cxnSpLocks/>
+          </p:cNvCxnSpPr>
+          <p:nvPr/>
+        </p:nvCxnSpPr>
+        <p:spPr>
+          <a:xfrm>
+            <a:off x="7028375" y="2675247"/>
+            <a:ext cx="664972" cy="0"/>
+          </a:xfrm>
+          <a:prstGeom prst="line">
+            <a:avLst/>
+          </a:prstGeom>
+          <a:ln w="19050">
+            <a:solidFill>
+              <a:schemeClr val="tx1"/>
+            </a:solidFill>
+            <a:prstDash val="sysDash"/>
           </a:ln>
         </p:spPr>
         <p:style>
@@ -4153,10 +4860,10 @@
       </p:cxnSp>
       <p:cxnSp>
         <p:nvCxnSpPr>
-          <p:cNvPr id="19" name="Straight Connector 18">
-            <a:extLst>
-              <a:ext uri="{FF2B5EF4-FFF2-40B4-BE49-F238E27FC236}">
-                <a16:creationId xmlns:a16="http://schemas.microsoft.com/office/drawing/2014/main" id="{E1B02CC4-AC99-4D8B-BAA0-FE35909BF50D}"/>
+          <p:cNvPr id="92" name="Straight Connector 91">
+            <a:extLst>
+              <a:ext uri="{FF2B5EF4-FFF2-40B4-BE49-F238E27FC236}">
+                <a16:creationId xmlns:a16="http://schemas.microsoft.com/office/drawing/2014/main" id="{82FB3EA8-92E6-4576-AAB0-EDE1EFD609D8}"/>
               </a:ext>
             </a:extLst>
           </p:cNvPr>
@@ -4167,13 +4874,13 @@
         </p:nvCxnSpPr>
         <p:spPr>
           <a:xfrm flipH="1">
-            <a:off x="9034660" y="5103811"/>
-            <a:ext cx="487680" cy="0"/>
+            <a:off x="7880410" y="2561774"/>
+            <a:ext cx="97536" cy="195072"/>
           </a:xfrm>
           <a:prstGeom prst="line">
             <a:avLst/>
           </a:prstGeom>
-          <a:ln w="28575">
+          <a:ln w="12700">
             <a:solidFill>
               <a:schemeClr val="tx1"/>
             </a:solidFill>
@@ -4194,270 +4901,12 @@
           </a:fontRef>
         </p:style>
       </p:cxnSp>
-      <p:cxnSp>
-        <p:nvCxnSpPr>
-          <p:cNvPr id="20" name="Straight Connector 19">
-            <a:extLst>
-              <a:ext uri="{FF2B5EF4-FFF2-40B4-BE49-F238E27FC236}">
-                <a16:creationId xmlns:a16="http://schemas.microsoft.com/office/drawing/2014/main" id="{8A4F5798-AF19-4580-932B-96E98B34AFFF}"/>
-              </a:ext>
-            </a:extLst>
-          </p:cNvPr>
-          <p:cNvCxnSpPr>
-            <a:cxnSpLocks/>
-          </p:cNvCxnSpPr>
-          <p:nvPr/>
-        </p:nvCxnSpPr>
-        <p:spPr>
-          <a:xfrm flipH="1">
-            <a:off x="9034660" y="5426899"/>
-            <a:ext cx="487680" cy="0"/>
-          </a:xfrm>
-          <a:prstGeom prst="line">
-            <a:avLst/>
-          </a:prstGeom>
-          <a:ln w="28575">
-            <a:solidFill>
-              <a:schemeClr val="tx1"/>
-            </a:solidFill>
-          </a:ln>
-        </p:spPr>
-        <p:style>
-          <a:lnRef idx="1">
-            <a:schemeClr val="accent1"/>
-          </a:lnRef>
-          <a:fillRef idx="0">
-            <a:schemeClr val="accent1"/>
-          </a:fillRef>
-          <a:effectRef idx="0">
-            <a:schemeClr val="accent1"/>
-          </a:effectRef>
-          <a:fontRef idx="minor">
-            <a:schemeClr val="tx1"/>
-          </a:fontRef>
-        </p:style>
-      </p:cxnSp>
-      <p:cxnSp>
-        <p:nvCxnSpPr>
-          <p:cNvPr id="21" name="Straight Connector 20">
-            <a:extLst>
-              <a:ext uri="{FF2B5EF4-FFF2-40B4-BE49-F238E27FC236}">
-                <a16:creationId xmlns:a16="http://schemas.microsoft.com/office/drawing/2014/main" id="{FD3E22E7-0DB2-4667-A022-86D36904EF0B}"/>
-              </a:ext>
-            </a:extLst>
-          </p:cNvPr>
-          <p:cNvCxnSpPr>
-            <a:cxnSpLocks/>
-          </p:cNvCxnSpPr>
-          <p:nvPr/>
-        </p:nvCxnSpPr>
-        <p:spPr>
-          <a:xfrm flipH="1">
-            <a:off x="11198740" y="4664899"/>
-            <a:ext cx="487680" cy="0"/>
-          </a:xfrm>
-          <a:prstGeom prst="line">
-            <a:avLst/>
-          </a:prstGeom>
-          <a:ln w="28575">
-            <a:solidFill>
-              <a:schemeClr val="tx1"/>
-            </a:solidFill>
-          </a:ln>
-        </p:spPr>
-        <p:style>
-          <a:lnRef idx="1">
-            <a:schemeClr val="accent1"/>
-          </a:lnRef>
-          <a:fillRef idx="0">
-            <a:schemeClr val="accent1"/>
-          </a:fillRef>
-          <a:effectRef idx="0">
-            <a:schemeClr val="accent1"/>
-          </a:effectRef>
-          <a:fontRef idx="minor">
-            <a:schemeClr val="tx1"/>
-          </a:fontRef>
-        </p:style>
-      </p:cxnSp>
-      <p:cxnSp>
-        <p:nvCxnSpPr>
-          <p:cNvPr id="22" name="Straight Connector 21">
-            <a:extLst>
-              <a:ext uri="{FF2B5EF4-FFF2-40B4-BE49-F238E27FC236}">
-                <a16:creationId xmlns:a16="http://schemas.microsoft.com/office/drawing/2014/main" id="{B042A2AB-90EC-41A4-88E5-47AE5221FCE4}"/>
-              </a:ext>
-            </a:extLst>
-          </p:cNvPr>
-          <p:cNvCxnSpPr>
-            <a:cxnSpLocks/>
-          </p:cNvCxnSpPr>
-          <p:nvPr/>
-        </p:nvCxnSpPr>
-        <p:spPr>
-          <a:xfrm flipH="1">
-            <a:off x="11198740" y="5055043"/>
-            <a:ext cx="487680" cy="0"/>
-          </a:xfrm>
-          <a:prstGeom prst="line">
-            <a:avLst/>
-          </a:prstGeom>
-          <a:ln w="28575">
-            <a:solidFill>
-              <a:schemeClr val="tx1"/>
-            </a:solidFill>
-          </a:ln>
-        </p:spPr>
-        <p:style>
-          <a:lnRef idx="1">
-            <a:schemeClr val="accent1"/>
-          </a:lnRef>
-          <a:fillRef idx="0">
-            <a:schemeClr val="accent1"/>
-          </a:fillRef>
-          <a:effectRef idx="0">
-            <a:schemeClr val="accent1"/>
-          </a:effectRef>
-          <a:fontRef idx="minor">
-            <a:schemeClr val="tx1"/>
-          </a:fontRef>
-        </p:style>
-      </p:cxnSp>
-      <p:cxnSp>
-        <p:nvCxnSpPr>
-          <p:cNvPr id="23" name="Straight Connector 22">
-            <a:extLst>
-              <a:ext uri="{FF2B5EF4-FFF2-40B4-BE49-F238E27FC236}">
-                <a16:creationId xmlns:a16="http://schemas.microsoft.com/office/drawing/2014/main" id="{63AA35DE-3FAA-47E0-9A69-0B18EE13E8EC}"/>
-              </a:ext>
-            </a:extLst>
-          </p:cNvPr>
-          <p:cNvCxnSpPr>
-            <a:cxnSpLocks/>
-          </p:cNvCxnSpPr>
-          <p:nvPr/>
-        </p:nvCxnSpPr>
-        <p:spPr>
-          <a:xfrm flipV="1">
-            <a:off x="10759828" y="6219379"/>
-            <a:ext cx="0" cy="377952"/>
-          </a:xfrm>
-          <a:prstGeom prst="line">
-            <a:avLst/>
-          </a:prstGeom>
-          <a:ln w="28575">
-            <a:solidFill>
-              <a:schemeClr val="tx1"/>
-            </a:solidFill>
-          </a:ln>
-        </p:spPr>
-        <p:style>
-          <a:lnRef idx="1">
-            <a:schemeClr val="accent1"/>
-          </a:lnRef>
-          <a:fillRef idx="0">
-            <a:schemeClr val="accent1"/>
-          </a:fillRef>
-          <a:effectRef idx="0">
-            <a:schemeClr val="accent1"/>
-          </a:effectRef>
-          <a:fontRef idx="minor">
-            <a:schemeClr val="tx1"/>
-          </a:fontRef>
-        </p:style>
-      </p:cxnSp>
-      <p:cxnSp>
-        <p:nvCxnSpPr>
-          <p:cNvPr id="24" name="Straight Connector 23">
-            <a:extLst>
-              <a:ext uri="{FF2B5EF4-FFF2-40B4-BE49-F238E27FC236}">
-                <a16:creationId xmlns:a16="http://schemas.microsoft.com/office/drawing/2014/main" id="{8FF78B10-997D-4E64-A0EC-517FDCC129E6}"/>
-              </a:ext>
-            </a:extLst>
-          </p:cNvPr>
-          <p:cNvCxnSpPr>
-            <a:cxnSpLocks/>
-          </p:cNvCxnSpPr>
-          <p:nvPr/>
-        </p:nvCxnSpPr>
-        <p:spPr>
-          <a:xfrm flipV="1">
-            <a:off x="9912484" y="6219379"/>
-            <a:ext cx="0" cy="377952"/>
-          </a:xfrm>
-          <a:prstGeom prst="line">
-            <a:avLst/>
-          </a:prstGeom>
-          <a:ln w="19050">
-            <a:solidFill>
-              <a:schemeClr val="tx1"/>
-            </a:solidFill>
-          </a:ln>
-        </p:spPr>
-        <p:style>
-          <a:lnRef idx="1">
-            <a:schemeClr val="accent1"/>
-          </a:lnRef>
-          <a:fillRef idx="0">
-            <a:schemeClr val="accent1"/>
-          </a:fillRef>
-          <a:effectRef idx="0">
-            <a:schemeClr val="accent1"/>
-          </a:effectRef>
-          <a:fontRef idx="minor">
-            <a:schemeClr val="tx1"/>
-          </a:fontRef>
-        </p:style>
-      </p:cxnSp>
-      <p:cxnSp>
-        <p:nvCxnSpPr>
-          <p:cNvPr id="25" name="Straight Connector 24">
-            <a:extLst>
-              <a:ext uri="{FF2B5EF4-FFF2-40B4-BE49-F238E27FC236}">
-                <a16:creationId xmlns:a16="http://schemas.microsoft.com/office/drawing/2014/main" id="{0863FAFD-D8B0-46C2-A169-F0877FE80EC8}"/>
-              </a:ext>
-            </a:extLst>
-          </p:cNvPr>
-          <p:cNvCxnSpPr>
-            <a:cxnSpLocks/>
-          </p:cNvCxnSpPr>
-          <p:nvPr/>
-        </p:nvCxnSpPr>
-        <p:spPr>
-          <a:xfrm flipH="1">
-            <a:off x="11204836" y="5865811"/>
-            <a:ext cx="481584" cy="0"/>
-          </a:xfrm>
-          <a:prstGeom prst="line">
-            <a:avLst/>
-          </a:prstGeom>
-          <a:ln w="19050">
-            <a:solidFill>
-              <a:schemeClr val="tx1"/>
-            </a:solidFill>
-          </a:ln>
-        </p:spPr>
-        <p:style>
-          <a:lnRef idx="1">
-            <a:schemeClr val="accent1"/>
-          </a:lnRef>
-          <a:fillRef idx="0">
-            <a:schemeClr val="accent1"/>
-          </a:fillRef>
-          <a:effectRef idx="0">
-            <a:schemeClr val="accent1"/>
-          </a:effectRef>
-          <a:fontRef idx="minor">
-            <a:schemeClr val="tx1"/>
-          </a:fontRef>
-        </p:style>
-      </p:cxnSp>
-      <p:sp>
-        <p:nvSpPr>
-          <p:cNvPr id="26" name="TextBox 25">
-            <a:extLst>
-              <a:ext uri="{FF2B5EF4-FFF2-40B4-BE49-F238E27FC236}">
-                <a16:creationId xmlns:a16="http://schemas.microsoft.com/office/drawing/2014/main" id="{67649602-31CB-4B3A-8379-BBEC7E6EDA77}"/>
+      <p:sp>
+        <p:nvSpPr>
+          <p:cNvPr id="93" name="TextBox 92">
+            <a:extLst>
+              <a:ext uri="{FF2B5EF4-FFF2-40B4-BE49-F238E27FC236}">
+                <a16:creationId xmlns:a16="http://schemas.microsoft.com/office/drawing/2014/main" id="{DB249C2A-ECAB-46A2-A709-7F8E96CDFCE6}"/>
               </a:ext>
             </a:extLst>
           </p:cNvPr>
@@ -4466,8 +4915,8 @@
         </p:nvSpPr>
         <p:spPr>
           <a:xfrm>
-            <a:off x="9497956" y="4541788"/>
-            <a:ext cx="445008" cy="246221"/>
+            <a:off x="7725978" y="2413224"/>
+            <a:ext cx="207264" cy="307777"/>
           </a:xfrm>
           <a:prstGeom prst="rect">
             <a:avLst/>
@@ -4481,504 +4930,7 @@
           <a:lstStyle/>
           <a:p>
             <a:r>
-              <a:rPr lang="en-US" sz="1000" b="1" dirty="0"/>
-              <a:t>Ra</a:t>
-            </a:r>
-          </a:p>
-        </p:txBody>
-      </p:sp>
-      <p:sp>
-        <p:nvSpPr>
-          <p:cNvPr id="27" name="TextBox 26">
-            <a:extLst>
-              <a:ext uri="{FF2B5EF4-FFF2-40B4-BE49-F238E27FC236}">
-                <a16:creationId xmlns:a16="http://schemas.microsoft.com/office/drawing/2014/main" id="{DC0CBD21-075D-4CDF-81D3-DEB2D099CAA2}"/>
-              </a:ext>
-            </a:extLst>
-          </p:cNvPr>
-          <p:cNvSpPr txBox="1"/>
-          <p:nvPr/>
-        </p:nvSpPr>
-        <p:spPr>
-          <a:xfrm>
-            <a:off x="9501004" y="4978246"/>
-            <a:ext cx="445008" cy="246221"/>
-          </a:xfrm>
-          <a:prstGeom prst="rect">
-            <a:avLst/>
-          </a:prstGeom>
-          <a:noFill/>
-        </p:spPr>
-        <p:txBody>
-          <a:bodyPr wrap="square" rtlCol="0">
-            <a:spAutoFit/>
-          </a:bodyPr>
-          <a:lstStyle/>
-          <a:p>
-            <a:r>
-              <a:rPr lang="en-US" sz="1000" b="1" dirty="0"/>
-              <a:t>Rb</a:t>
-            </a:r>
-          </a:p>
-        </p:txBody>
-      </p:sp>
-      <p:sp>
-        <p:nvSpPr>
-          <p:cNvPr id="28" name="TextBox 27">
-            <a:extLst>
-              <a:ext uri="{FF2B5EF4-FFF2-40B4-BE49-F238E27FC236}">
-                <a16:creationId xmlns:a16="http://schemas.microsoft.com/office/drawing/2014/main" id="{307A7D30-DA99-42D9-8C7A-8D6F8BB3B7A4}"/>
-              </a:ext>
-            </a:extLst>
-          </p:cNvPr>
-          <p:cNvSpPr txBox="1"/>
-          <p:nvPr/>
-        </p:nvSpPr>
-        <p:spPr>
-          <a:xfrm>
-            <a:off x="9497956" y="5303788"/>
-            <a:ext cx="445008" cy="246221"/>
-          </a:xfrm>
-          <a:prstGeom prst="rect">
-            <a:avLst/>
-          </a:prstGeom>
-          <a:noFill/>
-        </p:spPr>
-        <p:txBody>
-          <a:bodyPr wrap="square" rtlCol="0">
-            <a:spAutoFit/>
-          </a:bodyPr>
-          <a:lstStyle/>
-          <a:p>
-            <a:r>
-              <a:rPr lang="en-US" sz="1000" b="1" dirty="0" err="1"/>
-              <a:t>Rw</a:t>
-            </a:r>
-            <a:endParaRPr lang="en-US" sz="1000" b="1" dirty="0"/>
-          </a:p>
-        </p:txBody>
-      </p:sp>
-      <p:sp>
-        <p:nvSpPr>
-          <p:cNvPr id="29" name="TextBox 28">
-            <a:extLst>
-              <a:ext uri="{FF2B5EF4-FFF2-40B4-BE49-F238E27FC236}">
-                <a16:creationId xmlns:a16="http://schemas.microsoft.com/office/drawing/2014/main" id="{882DFB3B-8FC1-48E8-9A2F-74AC6EB63FCF}"/>
-              </a:ext>
-            </a:extLst>
-          </p:cNvPr>
-          <p:cNvSpPr txBox="1"/>
-          <p:nvPr/>
-        </p:nvSpPr>
-        <p:spPr>
-          <a:xfrm>
-            <a:off x="9720460" y="5973158"/>
-            <a:ext cx="445008" cy="246221"/>
-          </a:xfrm>
-          <a:prstGeom prst="rect">
-            <a:avLst/>
-          </a:prstGeom>
-          <a:noFill/>
-        </p:spPr>
-        <p:txBody>
-          <a:bodyPr wrap="square" rtlCol="0">
-            <a:spAutoFit/>
-          </a:bodyPr>
-          <a:lstStyle/>
-          <a:p>
-            <a:r>
-              <a:rPr lang="en-US" sz="1000" b="1" dirty="0"/>
-              <a:t>WE</a:t>
-            </a:r>
-          </a:p>
-        </p:txBody>
-      </p:sp>
-      <p:sp>
-        <p:nvSpPr>
-          <p:cNvPr id="30" name="TextBox 29">
-            <a:extLst>
-              <a:ext uri="{FF2B5EF4-FFF2-40B4-BE49-F238E27FC236}">
-                <a16:creationId xmlns:a16="http://schemas.microsoft.com/office/drawing/2014/main" id="{0143D53A-49BA-44C4-A25B-3692712D8E1A}"/>
-              </a:ext>
-            </a:extLst>
-          </p:cNvPr>
-          <p:cNvSpPr txBox="1"/>
-          <p:nvPr/>
-        </p:nvSpPr>
-        <p:spPr>
-          <a:xfrm>
-            <a:off x="10470267" y="5973158"/>
-            <a:ext cx="594360" cy="246221"/>
-          </a:xfrm>
-          <a:prstGeom prst="rect">
-            <a:avLst/>
-          </a:prstGeom>
-          <a:noFill/>
-        </p:spPr>
-        <p:txBody>
-          <a:bodyPr wrap="square" rtlCol="0">
-            <a:spAutoFit/>
-          </a:bodyPr>
-          <a:lstStyle/>
-          <a:p>
-            <a:r>
-              <a:rPr lang="en-US" sz="1000" b="1" dirty="0" err="1"/>
-              <a:t>dataW</a:t>
-            </a:r>
-            <a:endParaRPr lang="en-US" sz="1000" b="1" dirty="0"/>
-          </a:p>
-        </p:txBody>
-      </p:sp>
-      <p:sp>
-        <p:nvSpPr>
-          <p:cNvPr id="31" name="TextBox 30">
-            <a:extLst>
-              <a:ext uri="{FF2B5EF4-FFF2-40B4-BE49-F238E27FC236}">
-                <a16:creationId xmlns:a16="http://schemas.microsoft.com/office/drawing/2014/main" id="{84FD8C73-9665-43F1-98E8-5C2FFABF33E5}"/>
-              </a:ext>
-            </a:extLst>
-          </p:cNvPr>
-          <p:cNvSpPr txBox="1"/>
-          <p:nvPr/>
-        </p:nvSpPr>
-        <p:spPr>
-          <a:xfrm>
-            <a:off x="10802500" y="5733033"/>
-            <a:ext cx="594360" cy="246221"/>
-          </a:xfrm>
-          <a:prstGeom prst="rect">
-            <a:avLst/>
-          </a:prstGeom>
-          <a:noFill/>
-        </p:spPr>
-        <p:txBody>
-          <a:bodyPr wrap="square" rtlCol="0">
-            <a:spAutoFit/>
-          </a:bodyPr>
-          <a:lstStyle/>
-          <a:p>
-            <a:r>
-              <a:rPr lang="en-US" sz="1000" b="1" dirty="0"/>
-              <a:t>clock</a:t>
-            </a:r>
-          </a:p>
-        </p:txBody>
-      </p:sp>
-      <p:sp>
-        <p:nvSpPr>
-          <p:cNvPr id="32" name="TextBox 31">
-            <a:extLst>
-              <a:ext uri="{FF2B5EF4-FFF2-40B4-BE49-F238E27FC236}">
-                <a16:creationId xmlns:a16="http://schemas.microsoft.com/office/drawing/2014/main" id="{A60E14B0-7AB3-4024-A58F-0F9D2D853573}"/>
-              </a:ext>
-            </a:extLst>
-          </p:cNvPr>
-          <p:cNvSpPr txBox="1"/>
-          <p:nvPr/>
-        </p:nvSpPr>
-        <p:spPr>
-          <a:xfrm>
-            <a:off x="10753732" y="4938696"/>
-            <a:ext cx="594360" cy="246221"/>
-          </a:xfrm>
-          <a:prstGeom prst="rect">
-            <a:avLst/>
-          </a:prstGeom>
-          <a:noFill/>
-        </p:spPr>
-        <p:txBody>
-          <a:bodyPr wrap="square" rtlCol="0">
-            <a:spAutoFit/>
-          </a:bodyPr>
-          <a:lstStyle/>
-          <a:p>
-            <a:r>
-              <a:rPr lang="en-US" sz="1000" b="1" dirty="0" err="1"/>
-              <a:t>dataB</a:t>
-            </a:r>
-            <a:endParaRPr lang="en-US" sz="1000" b="1" dirty="0"/>
-          </a:p>
-        </p:txBody>
-      </p:sp>
-      <p:sp>
-        <p:nvSpPr>
-          <p:cNvPr id="33" name="TextBox 32">
-            <a:extLst>
-              <a:ext uri="{FF2B5EF4-FFF2-40B4-BE49-F238E27FC236}">
-                <a16:creationId xmlns:a16="http://schemas.microsoft.com/office/drawing/2014/main" id="{2CF24EA1-B4AA-4803-B088-4C5D3DB12934}"/>
-              </a:ext>
-            </a:extLst>
-          </p:cNvPr>
-          <p:cNvSpPr txBox="1"/>
-          <p:nvPr/>
-        </p:nvSpPr>
-        <p:spPr>
-          <a:xfrm>
-            <a:off x="10767447" y="4544980"/>
-            <a:ext cx="594360" cy="246221"/>
-          </a:xfrm>
-          <a:prstGeom prst="rect">
-            <a:avLst/>
-          </a:prstGeom>
-          <a:noFill/>
-        </p:spPr>
-        <p:txBody>
-          <a:bodyPr wrap="square" rtlCol="0">
-            <a:spAutoFit/>
-          </a:bodyPr>
-          <a:lstStyle/>
-          <a:p>
-            <a:r>
-              <a:rPr lang="en-US" sz="1000" b="1" dirty="0" err="1"/>
-              <a:t>dataA</a:t>
-            </a:r>
-            <a:endParaRPr lang="en-US" sz="1000" b="1" dirty="0"/>
-          </a:p>
-        </p:txBody>
-      </p:sp>
-      <p:cxnSp>
-        <p:nvCxnSpPr>
-          <p:cNvPr id="34" name="Straight Connector 33">
-            <a:extLst>
-              <a:ext uri="{FF2B5EF4-FFF2-40B4-BE49-F238E27FC236}">
-                <a16:creationId xmlns:a16="http://schemas.microsoft.com/office/drawing/2014/main" id="{DD595D79-4FDF-4D53-A6CB-DCBDACAD4878}"/>
-              </a:ext>
-            </a:extLst>
-          </p:cNvPr>
-          <p:cNvCxnSpPr>
-            <a:cxnSpLocks/>
-          </p:cNvCxnSpPr>
-          <p:nvPr/>
-        </p:nvCxnSpPr>
-        <p:spPr>
-          <a:xfrm flipH="1">
-            <a:off x="9348604" y="4993100"/>
-            <a:ext cx="97536" cy="195072"/>
-          </a:xfrm>
-          <a:prstGeom prst="line">
-            <a:avLst/>
-          </a:prstGeom>
-          <a:ln w="12700">
-            <a:solidFill>
-              <a:schemeClr val="tx1"/>
-            </a:solidFill>
-          </a:ln>
-        </p:spPr>
-        <p:style>
-          <a:lnRef idx="1">
-            <a:schemeClr val="accent1"/>
-          </a:lnRef>
-          <a:fillRef idx="0">
-            <a:schemeClr val="accent1"/>
-          </a:fillRef>
-          <a:effectRef idx="0">
-            <a:schemeClr val="accent1"/>
-          </a:effectRef>
-          <a:fontRef idx="minor">
-            <a:schemeClr val="tx1"/>
-          </a:fontRef>
-        </p:style>
-      </p:cxnSp>
-      <p:sp>
-        <p:nvSpPr>
-          <p:cNvPr id="35" name="TextBox 34">
-            <a:extLst>
-              <a:ext uri="{FF2B5EF4-FFF2-40B4-BE49-F238E27FC236}">
-                <a16:creationId xmlns:a16="http://schemas.microsoft.com/office/drawing/2014/main" id="{4B1612B6-98A1-4497-A16D-C3AC2D6183F0}"/>
-              </a:ext>
-            </a:extLst>
-          </p:cNvPr>
-          <p:cNvSpPr txBox="1"/>
-          <p:nvPr/>
-        </p:nvSpPr>
-        <p:spPr>
-          <a:xfrm>
-            <a:off x="9226684" y="4880583"/>
-            <a:ext cx="207264" cy="261610"/>
-          </a:xfrm>
-          <a:prstGeom prst="rect">
-            <a:avLst/>
-          </a:prstGeom>
-          <a:noFill/>
-        </p:spPr>
-        <p:txBody>
-          <a:bodyPr wrap="square" rtlCol="0">
-            <a:spAutoFit/>
-          </a:bodyPr>
-          <a:lstStyle/>
-          <a:p>
-            <a:r>
-              <a:rPr lang="en-US" sz="1100" dirty="0">
-                <a:solidFill>
-                  <a:schemeClr val="tx1">
-                    <a:lumMod val="85000"/>
-                    <a:lumOff val="15000"/>
-                  </a:schemeClr>
-                </a:solidFill>
-              </a:rPr>
-              <a:t>3</a:t>
-            </a:r>
-          </a:p>
-        </p:txBody>
-      </p:sp>
-      <p:cxnSp>
-        <p:nvCxnSpPr>
-          <p:cNvPr id="36" name="Straight Connector 35">
-            <a:extLst>
-              <a:ext uri="{FF2B5EF4-FFF2-40B4-BE49-F238E27FC236}">
-                <a16:creationId xmlns:a16="http://schemas.microsoft.com/office/drawing/2014/main" id="{E8761174-D250-4031-8DB7-47FA621B9923}"/>
-              </a:ext>
-            </a:extLst>
-          </p:cNvPr>
-          <p:cNvCxnSpPr>
-            <a:cxnSpLocks/>
-          </p:cNvCxnSpPr>
-          <p:nvPr/>
-        </p:nvCxnSpPr>
-        <p:spPr>
-          <a:xfrm flipH="1">
-            <a:off x="9353177" y="5333492"/>
-            <a:ext cx="97536" cy="195072"/>
-          </a:xfrm>
-          <a:prstGeom prst="line">
-            <a:avLst/>
-          </a:prstGeom>
-          <a:ln w="12700">
-            <a:solidFill>
-              <a:schemeClr val="tx1"/>
-            </a:solidFill>
-          </a:ln>
-        </p:spPr>
-        <p:style>
-          <a:lnRef idx="1">
-            <a:schemeClr val="accent1"/>
-          </a:lnRef>
-          <a:fillRef idx="0">
-            <a:schemeClr val="accent1"/>
-          </a:fillRef>
-          <a:effectRef idx="0">
-            <a:schemeClr val="accent1"/>
-          </a:effectRef>
-          <a:fontRef idx="minor">
-            <a:schemeClr val="tx1"/>
-          </a:fontRef>
-        </p:style>
-      </p:cxnSp>
-      <p:sp>
-        <p:nvSpPr>
-          <p:cNvPr id="37" name="TextBox 36">
-            <a:extLst>
-              <a:ext uri="{FF2B5EF4-FFF2-40B4-BE49-F238E27FC236}">
-                <a16:creationId xmlns:a16="http://schemas.microsoft.com/office/drawing/2014/main" id="{8A2A8948-81FE-4573-A076-FDCB4135526B}"/>
-              </a:ext>
-            </a:extLst>
-          </p:cNvPr>
-          <p:cNvSpPr txBox="1"/>
-          <p:nvPr/>
-        </p:nvSpPr>
-        <p:spPr>
-          <a:xfrm>
-            <a:off x="9231257" y="5220975"/>
-            <a:ext cx="207264" cy="261610"/>
-          </a:xfrm>
-          <a:prstGeom prst="rect">
-            <a:avLst/>
-          </a:prstGeom>
-          <a:noFill/>
-        </p:spPr>
-        <p:txBody>
-          <a:bodyPr wrap="square" rtlCol="0">
-            <a:spAutoFit/>
-          </a:bodyPr>
-          <a:lstStyle/>
-          <a:p>
-            <a:r>
-              <a:rPr lang="en-US" sz="1100" dirty="0">
-                <a:solidFill>
-                  <a:schemeClr val="tx1">
-                    <a:lumMod val="85000"/>
-                    <a:lumOff val="15000"/>
-                  </a:schemeClr>
-                </a:solidFill>
-              </a:rPr>
-              <a:t>3</a:t>
-            </a:r>
-          </a:p>
-        </p:txBody>
-      </p:sp>
-      <p:cxnSp>
-        <p:nvCxnSpPr>
-          <p:cNvPr id="38" name="Straight Connector 37">
-            <a:extLst>
-              <a:ext uri="{FF2B5EF4-FFF2-40B4-BE49-F238E27FC236}">
-                <a16:creationId xmlns:a16="http://schemas.microsoft.com/office/drawing/2014/main" id="{5A9224F7-E2F7-4BF2-A249-51C7943EC4A8}"/>
-              </a:ext>
-            </a:extLst>
-          </p:cNvPr>
-          <p:cNvCxnSpPr>
-            <a:cxnSpLocks/>
-          </p:cNvCxnSpPr>
-          <p:nvPr/>
-        </p:nvCxnSpPr>
-        <p:spPr>
-          <a:xfrm flipH="1">
-            <a:off x="10648576" y="6404907"/>
-            <a:ext cx="210312" cy="109194"/>
-          </a:xfrm>
-          <a:prstGeom prst="line">
-            <a:avLst/>
-          </a:prstGeom>
-          <a:ln w="12700">
-            <a:solidFill>
-              <a:schemeClr val="tx1"/>
-            </a:solidFill>
-          </a:ln>
-        </p:spPr>
-        <p:style>
-          <a:lnRef idx="1">
-            <a:schemeClr val="accent1"/>
-          </a:lnRef>
-          <a:fillRef idx="0">
-            <a:schemeClr val="accent1"/>
-          </a:fillRef>
-          <a:effectRef idx="0">
-            <a:schemeClr val="accent1"/>
-          </a:effectRef>
-          <a:fontRef idx="minor">
-            <a:schemeClr val="tx1"/>
-          </a:fontRef>
-        </p:style>
-      </p:cxnSp>
-      <p:sp>
-        <p:nvSpPr>
-          <p:cNvPr id="39" name="TextBox 38">
-            <a:extLst>
-              <a:ext uri="{FF2B5EF4-FFF2-40B4-BE49-F238E27FC236}">
-                <a16:creationId xmlns:a16="http://schemas.microsoft.com/office/drawing/2014/main" id="{92B88CE6-67D8-4233-B39D-CE9C7653EC98}"/>
-              </a:ext>
-            </a:extLst>
-          </p:cNvPr>
-          <p:cNvSpPr txBox="1"/>
-          <p:nvPr/>
-        </p:nvSpPr>
-        <p:spPr>
-          <a:xfrm>
-            <a:off x="10560183" y="6274102"/>
-            <a:ext cx="207264" cy="261610"/>
-          </a:xfrm>
-          <a:prstGeom prst="rect">
-            <a:avLst/>
-          </a:prstGeom>
-          <a:noFill/>
-        </p:spPr>
-        <p:txBody>
-          <a:bodyPr wrap="square" rtlCol="0">
-            <a:spAutoFit/>
-          </a:bodyPr>
-          <a:lstStyle/>
-          <a:p>
-            <a:r>
-              <a:rPr lang="en-US" sz="1100" dirty="0">
+              <a:rPr lang="en-US" sz="1400" dirty="0">
                 <a:solidFill>
                   <a:schemeClr val="tx1">
                     <a:lumMod val="85000"/>
@@ -4993,10 +4945,10 @@
       </p:sp>
       <p:cxnSp>
         <p:nvCxnSpPr>
-          <p:cNvPr id="40" name="Straight Connector 39">
-            <a:extLst>
-              <a:ext uri="{FF2B5EF4-FFF2-40B4-BE49-F238E27FC236}">
-                <a16:creationId xmlns:a16="http://schemas.microsoft.com/office/drawing/2014/main" id="{A3765A5E-ACA7-49D1-BBAF-24693208FB3F}"/>
+          <p:cNvPr id="94" name="Straight Connector 93">
+            <a:extLst>
+              <a:ext uri="{FF2B5EF4-FFF2-40B4-BE49-F238E27FC236}">
+                <a16:creationId xmlns:a16="http://schemas.microsoft.com/office/drawing/2014/main" id="{0D938CC1-D354-43D0-BBCE-35BB9661A767}"/>
               </a:ext>
             </a:extLst>
           </p:cNvPr>
@@ -5007,16 +4959,17 @@
         </p:nvCxnSpPr>
         <p:spPr>
           <a:xfrm flipH="1">
-            <a:off x="11404479" y="4577635"/>
-            <a:ext cx="97536" cy="195072"/>
+            <a:off x="7694482" y="2660704"/>
+            <a:ext cx="487680" cy="0"/>
           </a:xfrm>
           <a:prstGeom prst="line">
             <a:avLst/>
           </a:prstGeom>
-          <a:ln w="12700">
+          <a:ln w="28575">
             <a:solidFill>
               <a:schemeClr val="tx1"/>
             </a:solidFill>
+            <a:headEnd type="triangle"/>
           </a:ln>
         </p:spPr>
         <p:style>
@@ -5036,10 +4989,10 @@
       </p:cxnSp>
       <p:sp>
         <p:nvSpPr>
-          <p:cNvPr id="41" name="TextBox 40">
-            <a:extLst>
-              <a:ext uri="{FF2B5EF4-FFF2-40B4-BE49-F238E27FC236}">
-                <a16:creationId xmlns:a16="http://schemas.microsoft.com/office/drawing/2014/main" id="{FEDB07C0-F5D7-4854-8756-B5E3B727E32E}"/>
+          <p:cNvPr id="95" name="TextBox 94">
+            <a:extLst>
+              <a:ext uri="{FF2B5EF4-FFF2-40B4-BE49-F238E27FC236}">
+                <a16:creationId xmlns:a16="http://schemas.microsoft.com/office/drawing/2014/main" id="{30D27A39-859B-4989-B0FA-6301E0FBE7BC}"/>
               </a:ext>
             </a:extLst>
           </p:cNvPr>
@@ -5048,8 +5001,8 @@
         </p:nvSpPr>
         <p:spPr>
           <a:xfrm>
-            <a:off x="11282559" y="4465118"/>
-            <a:ext cx="207264" cy="261610"/>
+            <a:off x="8158891" y="2502697"/>
+            <a:ext cx="716788" cy="276999"/>
           </a:xfrm>
           <a:prstGeom prst="rect">
             <a:avLst/>
@@ -5063,364 +5016,10 @@
           <a:lstStyle/>
           <a:p>
             <a:r>
-              <a:rPr lang="en-US" sz="1100" dirty="0">
-                <a:solidFill>
-                  <a:schemeClr val="tx1">
-                    <a:lumMod val="85000"/>
-                    <a:lumOff val="15000"/>
-                  </a:schemeClr>
-                </a:solidFill>
-              </a:rPr>
-              <a:t>8</a:t>
-            </a:r>
-          </a:p>
-        </p:txBody>
-      </p:sp>
-      <p:cxnSp>
-        <p:nvCxnSpPr>
-          <p:cNvPr id="42" name="Straight Connector 41">
-            <a:extLst>
-              <a:ext uri="{FF2B5EF4-FFF2-40B4-BE49-F238E27FC236}">
-                <a16:creationId xmlns:a16="http://schemas.microsoft.com/office/drawing/2014/main" id="{CA9C0B92-95C4-4B26-91C9-9A4044F76E70}"/>
-              </a:ext>
-            </a:extLst>
-          </p:cNvPr>
-          <p:cNvCxnSpPr>
-            <a:cxnSpLocks/>
-          </p:cNvCxnSpPr>
-          <p:nvPr/>
-        </p:nvCxnSpPr>
-        <p:spPr>
-          <a:xfrm flipH="1">
-            <a:off x="11422767" y="4954718"/>
-            <a:ext cx="97536" cy="195072"/>
-          </a:xfrm>
-          <a:prstGeom prst="line">
-            <a:avLst/>
-          </a:prstGeom>
-          <a:ln w="12700">
-            <a:solidFill>
-              <a:schemeClr val="tx1"/>
-            </a:solidFill>
-          </a:ln>
-        </p:spPr>
-        <p:style>
-          <a:lnRef idx="1">
-            <a:schemeClr val="accent1"/>
-          </a:lnRef>
-          <a:fillRef idx="0">
-            <a:schemeClr val="accent1"/>
-          </a:fillRef>
-          <a:effectRef idx="0">
-            <a:schemeClr val="accent1"/>
-          </a:effectRef>
-          <a:fontRef idx="minor">
-            <a:schemeClr val="tx1"/>
-          </a:fontRef>
-        </p:style>
-      </p:cxnSp>
-      <p:sp>
-        <p:nvSpPr>
-          <p:cNvPr id="43" name="TextBox 42">
-            <a:extLst>
-              <a:ext uri="{FF2B5EF4-FFF2-40B4-BE49-F238E27FC236}">
-                <a16:creationId xmlns:a16="http://schemas.microsoft.com/office/drawing/2014/main" id="{150B82AE-8CBC-464E-8DF0-555728C2D504}"/>
-              </a:ext>
-            </a:extLst>
-          </p:cNvPr>
-          <p:cNvSpPr txBox="1"/>
-          <p:nvPr/>
-        </p:nvSpPr>
-        <p:spPr>
-          <a:xfrm>
-            <a:off x="11300847" y="4848297"/>
-            <a:ext cx="207264" cy="261610"/>
-          </a:xfrm>
-          <a:prstGeom prst="rect">
-            <a:avLst/>
-          </a:prstGeom>
-          <a:noFill/>
-        </p:spPr>
-        <p:txBody>
-          <a:bodyPr wrap="square" rtlCol="0">
-            <a:spAutoFit/>
-          </a:bodyPr>
-          <a:lstStyle/>
-          <a:p>
-            <a:r>
-              <a:rPr lang="en-US" sz="1100" dirty="0">
-                <a:solidFill>
-                  <a:schemeClr val="tx1">
-                    <a:lumMod val="85000"/>
-                    <a:lumOff val="15000"/>
-                  </a:schemeClr>
-                </a:solidFill>
-              </a:rPr>
-              <a:t>8</a:t>
-            </a:r>
-          </a:p>
-        </p:txBody>
-      </p:sp>
-      <p:sp>
-        <p:nvSpPr>
-          <p:cNvPr id="44" name="TextBox 43">
-            <a:extLst>
-              <a:ext uri="{FF2B5EF4-FFF2-40B4-BE49-F238E27FC236}">
-                <a16:creationId xmlns:a16="http://schemas.microsoft.com/office/drawing/2014/main" id="{C53ADDDF-1F14-4A82-8B38-A35747D3F119}"/>
-              </a:ext>
-            </a:extLst>
-          </p:cNvPr>
-          <p:cNvSpPr txBox="1"/>
-          <p:nvPr/>
-        </p:nvSpPr>
-        <p:spPr>
-          <a:xfrm>
-            <a:off x="9637268" y="3429000"/>
-            <a:ext cx="1932432" cy="369332"/>
-          </a:xfrm>
-          <a:prstGeom prst="rect">
-            <a:avLst/>
-          </a:prstGeom>
-          <a:noFill/>
-        </p:spPr>
-        <p:txBody>
-          <a:bodyPr wrap="square" rtlCol="0">
-            <a:spAutoFit/>
-          </a:bodyPr>
-          <a:lstStyle/>
-          <a:p>
-            <a:r>
-              <a:rPr lang="en-US" dirty="0"/>
-              <a:t>Register file</a:t>
-            </a:r>
-          </a:p>
-        </p:txBody>
-      </p:sp>
-      <p:sp>
-        <p:nvSpPr>
-          <p:cNvPr id="47" name="Rectangle 46">
-            <a:extLst>
-              <a:ext uri="{FF2B5EF4-FFF2-40B4-BE49-F238E27FC236}">
-                <a16:creationId xmlns:a16="http://schemas.microsoft.com/office/drawing/2014/main" id="{0A4372B2-BD5E-4F15-B2AF-9710334D3FBF}"/>
-              </a:ext>
-            </a:extLst>
-          </p:cNvPr>
-          <p:cNvSpPr/>
-          <p:nvPr/>
-        </p:nvSpPr>
-        <p:spPr>
-          <a:xfrm>
-            <a:off x="2543753" y="1751340"/>
-            <a:ext cx="5149594" cy="3215296"/>
-          </a:xfrm>
-          <a:prstGeom prst="rect">
-            <a:avLst/>
-          </a:prstGeom>
-          <a:noFill/>
-          <a:ln w="28575">
-            <a:solidFill>
-              <a:schemeClr val="tx1"/>
-            </a:solidFill>
-          </a:ln>
-        </p:spPr>
-        <p:style>
-          <a:lnRef idx="2">
-            <a:schemeClr val="accent1">
-              <a:shade val="50000"/>
-            </a:schemeClr>
-          </a:lnRef>
-          <a:fillRef idx="1">
-            <a:schemeClr val="accent1"/>
-          </a:fillRef>
-          <a:effectRef idx="0">
-            <a:schemeClr val="accent1"/>
-          </a:effectRef>
-          <a:fontRef idx="minor">
-            <a:schemeClr val="lt1"/>
-          </a:fontRef>
-        </p:style>
-        <p:txBody>
-          <a:bodyPr rtlCol="0" anchor="ctr"/>
-          <a:lstStyle/>
-          <a:p>
-            <a:pPr algn="ctr"/>
-            <a:endParaRPr lang="en-US"/>
-          </a:p>
-        </p:txBody>
-      </p:sp>
-      <p:sp>
-        <p:nvSpPr>
-          <p:cNvPr id="74" name="TextBox 73">
-            <a:extLst>
-              <a:ext uri="{FF2B5EF4-FFF2-40B4-BE49-F238E27FC236}">
-                <a16:creationId xmlns:a16="http://schemas.microsoft.com/office/drawing/2014/main" id="{1558250A-F2E1-493F-AE92-85305D710B9E}"/>
-              </a:ext>
-            </a:extLst>
-          </p:cNvPr>
-          <p:cNvSpPr txBox="1"/>
-          <p:nvPr/>
-        </p:nvSpPr>
-        <p:spPr>
-          <a:xfrm>
-            <a:off x="4143248" y="2484925"/>
-            <a:ext cx="1932432" cy="369332"/>
-          </a:xfrm>
-          <a:prstGeom prst="rect">
-            <a:avLst/>
-          </a:prstGeom>
-          <a:noFill/>
-        </p:spPr>
-        <p:txBody>
-          <a:bodyPr wrap="square" rtlCol="0">
-            <a:spAutoFit/>
-          </a:bodyPr>
-          <a:lstStyle/>
-          <a:p>
-            <a:pPr algn="ctr"/>
-            <a:r>
-              <a:rPr lang="en-US" dirty="0"/>
-              <a:t>Data Path</a:t>
-            </a:r>
-          </a:p>
-        </p:txBody>
-      </p:sp>
-      <p:sp>
-        <p:nvSpPr>
-          <p:cNvPr id="75" name="Rectangle 74">
-            <a:extLst>
-              <a:ext uri="{FF2B5EF4-FFF2-40B4-BE49-F238E27FC236}">
-                <a16:creationId xmlns:a16="http://schemas.microsoft.com/office/drawing/2014/main" id="{19C8C219-F673-477D-8318-0C00ADE11EE7}"/>
-              </a:ext>
-            </a:extLst>
-          </p:cNvPr>
-          <p:cNvSpPr/>
-          <p:nvPr/>
-        </p:nvSpPr>
-        <p:spPr>
-          <a:xfrm>
-            <a:off x="3241356" y="2105635"/>
-            <a:ext cx="3787019" cy="1127912"/>
-          </a:xfrm>
-          <a:prstGeom prst="rect">
-            <a:avLst/>
-          </a:prstGeom>
-          <a:noFill/>
-          <a:ln w="19050">
-            <a:solidFill>
-              <a:schemeClr val="tx1"/>
-            </a:solidFill>
-          </a:ln>
-        </p:spPr>
-        <p:style>
-          <a:lnRef idx="2">
-            <a:schemeClr val="accent1">
-              <a:shade val="50000"/>
-            </a:schemeClr>
-          </a:lnRef>
-          <a:fillRef idx="1">
-            <a:schemeClr val="accent1"/>
-          </a:fillRef>
-          <a:effectRef idx="0">
-            <a:schemeClr val="accent1"/>
-          </a:effectRef>
-          <a:fontRef idx="minor">
-            <a:schemeClr val="lt1"/>
-          </a:fontRef>
-        </p:style>
-        <p:txBody>
-          <a:bodyPr rtlCol="0" anchor="ctr"/>
-          <a:lstStyle/>
-          <a:p>
-            <a:pPr algn="ctr"/>
-            <a:endParaRPr lang="en-US"/>
-          </a:p>
-        </p:txBody>
-      </p:sp>
-      <p:sp>
-        <p:nvSpPr>
-          <p:cNvPr id="76" name="TextBox 75">
-            <a:extLst>
-              <a:ext uri="{FF2B5EF4-FFF2-40B4-BE49-F238E27FC236}">
-                <a16:creationId xmlns:a16="http://schemas.microsoft.com/office/drawing/2014/main" id="{974333F6-0AC2-48EB-A992-446AAEDE8A73}"/>
-              </a:ext>
-            </a:extLst>
-          </p:cNvPr>
-          <p:cNvSpPr txBox="1"/>
-          <p:nvPr/>
-        </p:nvSpPr>
-        <p:spPr>
-          <a:xfrm>
-            <a:off x="3083560" y="4021247"/>
-            <a:ext cx="1932432" cy="369332"/>
-          </a:xfrm>
-          <a:prstGeom prst="rect">
-            <a:avLst/>
-          </a:prstGeom>
-          <a:noFill/>
-        </p:spPr>
-        <p:txBody>
-          <a:bodyPr wrap="square" rtlCol="0">
-            <a:spAutoFit/>
-          </a:bodyPr>
-          <a:lstStyle/>
-          <a:p>
-            <a:pPr algn="ctr"/>
-            <a:r>
-              <a:rPr lang="en-US" dirty="0"/>
-              <a:t>Control unit</a:t>
-            </a:r>
-          </a:p>
-        </p:txBody>
-      </p:sp>
-      <p:sp>
-        <p:nvSpPr>
-          <p:cNvPr id="77" name="Rectangle: Rounded Corners 76">
-            <a:extLst>
-              <a:ext uri="{FF2B5EF4-FFF2-40B4-BE49-F238E27FC236}">
-                <a16:creationId xmlns:a16="http://schemas.microsoft.com/office/drawing/2014/main" id="{FCE4DE33-7B45-4E0B-8E94-9B60A44FBD1B}"/>
-              </a:ext>
-            </a:extLst>
-          </p:cNvPr>
-          <p:cNvSpPr/>
-          <p:nvPr/>
-        </p:nvSpPr>
-        <p:spPr>
-          <a:xfrm>
-            <a:off x="3240690" y="3897051"/>
-            <a:ext cx="1618172" cy="617723"/>
-          </a:xfrm>
-          <a:prstGeom prst="roundRect">
-            <a:avLst/>
-          </a:prstGeom>
-          <a:noFill/>
-          <a:ln w="19050">
-            <a:solidFill>
-              <a:schemeClr val="tx1"/>
-            </a:solidFill>
-          </a:ln>
-        </p:spPr>
-        <p:style>
-          <a:lnRef idx="2">
-            <a:schemeClr val="accent1">
-              <a:shade val="50000"/>
-            </a:schemeClr>
-          </a:lnRef>
-          <a:fillRef idx="1">
-            <a:schemeClr val="accent1"/>
-          </a:fillRef>
-          <a:effectRef idx="0">
-            <a:schemeClr val="accent1"/>
-          </a:effectRef>
-          <a:fontRef idx="minor">
-            <a:schemeClr val="lt1"/>
-          </a:fontRef>
-        </p:style>
-        <p:txBody>
-          <a:bodyPr rtlCol="0" anchor="ctr"/>
-          <a:lstStyle/>
-          <a:p>
-            <a:pPr algn="ctr"/>
-            <a:endParaRPr lang="en-US"/>
+              <a:rPr lang="en-US" sz="1200" b="1" dirty="0" err="1"/>
+              <a:t>dataOut</a:t>
+            </a:r>
+            <a:endParaRPr lang="en-US" sz="1200" b="1" dirty="0"/>
           </a:p>
         </p:txBody>
       </p:sp>

</xml_diff>

<commit_message>
finished the report & tested and validated the results
</commit_message>
<xml_diff>
--- a/report/images.pptx
+++ b/report/images.pptx
@@ -12,6 +12,7 @@
     <p:sldId id="260" r:id="rId6"/>
     <p:sldId id="258" r:id="rId7"/>
     <p:sldId id="261" r:id="rId8"/>
+    <p:sldId id="263" r:id="rId9"/>
   </p:sldIdLst>
   <p:sldSz cx="12192000" cy="6858000"/>
   <p:notesSz cx="6858000" cy="9144000"/>
@@ -265,7 +266,7 @@
           <a:p>
             <a:fld id="{345EB37C-DF05-422A-A2AF-6FFA78C85251}" type="datetimeFigureOut">
               <a:rPr lang="en-US" smtClean="0"/>
-              <a:t>9/22/2021</a:t>
+              <a:t>9/24/2021</a:t>
             </a:fld>
             <a:endParaRPr lang="en-US"/>
           </a:p>
@@ -463,7 +464,7 @@
           <a:p>
             <a:fld id="{345EB37C-DF05-422A-A2AF-6FFA78C85251}" type="datetimeFigureOut">
               <a:rPr lang="en-US" smtClean="0"/>
-              <a:t>9/22/2021</a:t>
+              <a:t>9/24/2021</a:t>
             </a:fld>
             <a:endParaRPr lang="en-US"/>
           </a:p>
@@ -671,7 +672,7 @@
           <a:p>
             <a:fld id="{345EB37C-DF05-422A-A2AF-6FFA78C85251}" type="datetimeFigureOut">
               <a:rPr lang="en-US" smtClean="0"/>
-              <a:t>9/22/2021</a:t>
+              <a:t>9/24/2021</a:t>
             </a:fld>
             <a:endParaRPr lang="en-US"/>
           </a:p>
@@ -869,7 +870,7 @@
           <a:p>
             <a:fld id="{345EB37C-DF05-422A-A2AF-6FFA78C85251}" type="datetimeFigureOut">
               <a:rPr lang="en-US" smtClean="0"/>
-              <a:t>9/22/2021</a:t>
+              <a:t>9/24/2021</a:t>
             </a:fld>
             <a:endParaRPr lang="en-US"/>
           </a:p>
@@ -1144,7 +1145,7 @@
           <a:p>
             <a:fld id="{345EB37C-DF05-422A-A2AF-6FFA78C85251}" type="datetimeFigureOut">
               <a:rPr lang="en-US" smtClean="0"/>
-              <a:t>9/22/2021</a:t>
+              <a:t>9/24/2021</a:t>
             </a:fld>
             <a:endParaRPr lang="en-US"/>
           </a:p>
@@ -1409,7 +1410,7 @@
           <a:p>
             <a:fld id="{345EB37C-DF05-422A-A2AF-6FFA78C85251}" type="datetimeFigureOut">
               <a:rPr lang="en-US" smtClean="0"/>
-              <a:t>9/22/2021</a:t>
+              <a:t>9/24/2021</a:t>
             </a:fld>
             <a:endParaRPr lang="en-US"/>
           </a:p>
@@ -1821,7 +1822,7 @@
           <a:p>
             <a:fld id="{345EB37C-DF05-422A-A2AF-6FFA78C85251}" type="datetimeFigureOut">
               <a:rPr lang="en-US" smtClean="0"/>
-              <a:t>9/22/2021</a:t>
+              <a:t>9/24/2021</a:t>
             </a:fld>
             <a:endParaRPr lang="en-US"/>
           </a:p>
@@ -1962,7 +1963,7 @@
           <a:p>
             <a:fld id="{345EB37C-DF05-422A-A2AF-6FFA78C85251}" type="datetimeFigureOut">
               <a:rPr lang="en-US" smtClean="0"/>
-              <a:t>9/22/2021</a:t>
+              <a:t>9/24/2021</a:t>
             </a:fld>
             <a:endParaRPr lang="en-US"/>
           </a:p>
@@ -2075,7 +2076,7 @@
           <a:p>
             <a:fld id="{345EB37C-DF05-422A-A2AF-6FFA78C85251}" type="datetimeFigureOut">
               <a:rPr lang="en-US" smtClean="0"/>
-              <a:t>9/22/2021</a:t>
+              <a:t>9/24/2021</a:t>
             </a:fld>
             <a:endParaRPr lang="en-US"/>
           </a:p>
@@ -2386,7 +2387,7 @@
           <a:p>
             <a:fld id="{345EB37C-DF05-422A-A2AF-6FFA78C85251}" type="datetimeFigureOut">
               <a:rPr lang="en-US" smtClean="0"/>
-              <a:t>9/22/2021</a:t>
+              <a:t>9/24/2021</a:t>
             </a:fld>
             <a:endParaRPr lang="en-US"/>
           </a:p>
@@ -2674,7 +2675,7 @@
           <a:p>
             <a:fld id="{345EB37C-DF05-422A-A2AF-6FFA78C85251}" type="datetimeFigureOut">
               <a:rPr lang="en-US" smtClean="0"/>
-              <a:t>9/22/2021</a:t>
+              <a:t>9/24/2021</a:t>
             </a:fld>
             <a:endParaRPr lang="en-US"/>
           </a:p>
@@ -2915,7 +2916,7 @@
           <a:p>
             <a:fld id="{345EB37C-DF05-422A-A2AF-6FFA78C85251}" type="datetimeFigureOut">
               <a:rPr lang="en-US" smtClean="0"/>
-              <a:t>9/22/2021</a:t>
+              <a:t>9/24/2021</a:t>
             </a:fld>
             <a:endParaRPr lang="en-US"/>
           </a:p>
@@ -9504,42 +9505,6 @@
       </p:sp>
       <p:sp>
         <p:nvSpPr>
-          <p:cNvPr id="51" name="TextBox 50">
-            <a:extLst>
-              <a:ext uri="{FF2B5EF4-FFF2-40B4-BE49-F238E27FC236}">
-                <a16:creationId xmlns:a16="http://schemas.microsoft.com/office/drawing/2014/main" id="{3E852FE9-6B08-45B6-A407-B268B605C250}"/>
-              </a:ext>
-            </a:extLst>
-          </p:cNvPr>
-          <p:cNvSpPr txBox="1"/>
-          <p:nvPr/>
-        </p:nvSpPr>
-        <p:spPr>
-          <a:xfrm>
-            <a:off x="4904403" y="116935"/>
-            <a:ext cx="1932432" cy="369332"/>
-          </a:xfrm>
-          <a:prstGeom prst="rect">
-            <a:avLst/>
-          </a:prstGeom>
-          <a:noFill/>
-        </p:spPr>
-        <p:txBody>
-          <a:bodyPr wrap="square" rtlCol="0">
-            <a:spAutoFit/>
-          </a:bodyPr>
-          <a:lstStyle/>
-          <a:p>
-            <a:r>
-              <a:rPr lang="en-US" dirty="0" err="1"/>
-              <a:t>datapath</a:t>
-            </a:r>
-            <a:endParaRPr lang="en-US" dirty="0"/>
-          </a:p>
-        </p:txBody>
-      </p:sp>
-      <p:sp>
-        <p:nvSpPr>
           <p:cNvPr id="38" name="TextBox 37">
             <a:extLst>
               <a:ext uri="{FF2B5EF4-FFF2-40B4-BE49-F238E27FC236}">
@@ -10558,8 +10523,8 @@
         </p:nvSpPr>
         <p:spPr>
           <a:xfrm>
-            <a:off x="7349625" y="4185831"/>
-            <a:ext cx="594360" cy="276999"/>
+            <a:off x="7349624" y="4185831"/>
+            <a:ext cx="720531" cy="276999"/>
           </a:xfrm>
           <a:prstGeom prst="rect">
             <a:avLst/>
@@ -10578,7 +10543,7 @@
                   <a:srgbClr val="FF0000"/>
                 </a:solidFill>
               </a:rPr>
-              <a:t>disSrc</a:t>
+              <a:t>distSrc</a:t>
             </a:r>
             <a:endParaRPr lang="en-US" sz="1200" b="1" dirty="0">
               <a:solidFill>
@@ -12054,6 +12019,757 @@
     <p:extLst>
       <p:ext uri="{BB962C8B-B14F-4D97-AF65-F5344CB8AC3E}">
         <p14:creationId xmlns:p14="http://schemas.microsoft.com/office/powerpoint/2010/main" val="1754099483"/>
+      </p:ext>
+    </p:extLst>
+  </p:cSld>
+  <p:clrMapOvr>
+    <a:masterClrMapping/>
+  </p:clrMapOvr>
+</p:sld>
+</file>
+
+<file path=ppt/slides/slide8.xml><?xml version="1.0" encoding="utf-8"?>
+<p:sld xmlns:a="http://schemas.openxmlformats.org/drawingml/2006/main" xmlns:r="http://schemas.openxmlformats.org/officeDocument/2006/relationships" xmlns:p="http://schemas.openxmlformats.org/presentationml/2006/main">
+  <p:cSld>
+    <p:spTree>
+      <p:nvGrpSpPr>
+        <p:cNvPr id="1" name=""/>
+        <p:cNvGrpSpPr/>
+        <p:nvPr/>
+      </p:nvGrpSpPr>
+      <p:grpSpPr>
+        <a:xfrm>
+          <a:off x="0" y="0"/>
+          <a:ext cx="0" cy="0"/>
+          <a:chOff x="0" y="0"/>
+          <a:chExt cx="0" cy="0"/>
+        </a:xfrm>
+      </p:grpSpPr>
+      <p:sp>
+        <p:nvSpPr>
+          <p:cNvPr id="2" name="Rectangle 1">
+            <a:extLst>
+              <a:ext uri="{FF2B5EF4-FFF2-40B4-BE49-F238E27FC236}">
+                <a16:creationId xmlns:a16="http://schemas.microsoft.com/office/drawing/2014/main" id="{7F853D5E-8E43-4D94-B352-08ADC89750C2}"/>
+              </a:ext>
+            </a:extLst>
+          </p:cNvPr>
+          <p:cNvSpPr/>
+          <p:nvPr/>
+        </p:nvSpPr>
+        <p:spPr>
+          <a:xfrm>
+            <a:off x="1992646" y="3621739"/>
+            <a:ext cx="1297401" cy="715737"/>
+          </a:xfrm>
+          <a:prstGeom prst="rect">
+            <a:avLst/>
+          </a:prstGeom>
+          <a:solidFill>
+            <a:schemeClr val="bg2"/>
+          </a:solidFill>
+          <a:ln>
+            <a:noFill/>
+          </a:ln>
+        </p:spPr>
+        <p:style>
+          <a:lnRef idx="2">
+            <a:schemeClr val="accent1">
+              <a:shade val="50000"/>
+            </a:schemeClr>
+          </a:lnRef>
+          <a:fillRef idx="1">
+            <a:schemeClr val="accent1"/>
+          </a:fillRef>
+          <a:effectRef idx="0">
+            <a:schemeClr val="accent1"/>
+          </a:effectRef>
+          <a:fontRef idx="minor">
+            <a:schemeClr val="lt1"/>
+          </a:fontRef>
+        </p:style>
+        <p:txBody>
+          <a:bodyPr rtlCol="0" anchor="ctr"/>
+          <a:lstStyle/>
+          <a:p>
+            <a:pPr algn="ctr"/>
+            <a:r>
+              <a:rPr lang="en-US" sz="1600" b="1" dirty="0">
+                <a:solidFill>
+                  <a:schemeClr val="tx2"/>
+                </a:solidFill>
+                <a:latin typeface="Bahij Janna" panose="02040503050201020203" pitchFamily="18" charset="-78"/>
+                <a:cs typeface="Bahij Janna" panose="02040503050201020203" pitchFamily="18" charset="-78"/>
+              </a:rPr>
+              <a:t>opcode</a:t>
+            </a:r>
+          </a:p>
+        </p:txBody>
+      </p:sp>
+      <p:sp>
+        <p:nvSpPr>
+          <p:cNvPr id="21" name="Rectangle 20">
+            <a:extLst>
+              <a:ext uri="{FF2B5EF4-FFF2-40B4-BE49-F238E27FC236}">
+                <a16:creationId xmlns:a16="http://schemas.microsoft.com/office/drawing/2014/main" id="{855E0A2B-302F-4014-8D0D-C1D533A1FC10}"/>
+              </a:ext>
+            </a:extLst>
+          </p:cNvPr>
+          <p:cNvSpPr/>
+          <p:nvPr/>
+        </p:nvSpPr>
+        <p:spPr>
+          <a:xfrm>
+            <a:off x="3290047" y="3621739"/>
+            <a:ext cx="1297401" cy="715737"/>
+          </a:xfrm>
+          <a:prstGeom prst="rect">
+            <a:avLst/>
+          </a:prstGeom>
+          <a:solidFill>
+            <a:schemeClr val="bg2">
+              <a:lumMod val="90000"/>
+            </a:schemeClr>
+          </a:solidFill>
+          <a:ln>
+            <a:noFill/>
+          </a:ln>
+        </p:spPr>
+        <p:style>
+          <a:lnRef idx="2">
+            <a:schemeClr val="accent1">
+              <a:shade val="50000"/>
+            </a:schemeClr>
+          </a:lnRef>
+          <a:fillRef idx="1">
+            <a:schemeClr val="accent1"/>
+          </a:fillRef>
+          <a:effectRef idx="0">
+            <a:schemeClr val="accent1"/>
+          </a:effectRef>
+          <a:fontRef idx="minor">
+            <a:schemeClr val="lt1"/>
+          </a:fontRef>
+        </p:style>
+        <p:txBody>
+          <a:bodyPr rtlCol="0" anchor="ctr"/>
+          <a:lstStyle/>
+          <a:p>
+            <a:pPr algn="ctr"/>
+            <a:r>
+              <a:rPr lang="en-US" sz="1600" b="1" dirty="0">
+                <a:solidFill>
+                  <a:schemeClr val="tx2"/>
+                </a:solidFill>
+                <a:latin typeface="Bahij Janna" panose="02040503050201020203" pitchFamily="18" charset="-78"/>
+                <a:cs typeface="Bahij Janna" panose="02040503050201020203" pitchFamily="18" charset="-78"/>
+              </a:rPr>
+              <a:t>Reg-A</a:t>
+            </a:r>
+          </a:p>
+          <a:p>
+            <a:pPr algn="ctr"/>
+            <a:r>
+              <a:rPr lang="en-US" sz="1600" b="1" dirty="0">
+                <a:solidFill>
+                  <a:schemeClr val="tx2"/>
+                </a:solidFill>
+                <a:latin typeface="Bahij Janna" panose="02040503050201020203" pitchFamily="18" charset="-78"/>
+                <a:cs typeface="Bahij Janna" panose="02040503050201020203" pitchFamily="18" charset="-78"/>
+              </a:rPr>
+              <a:t>Address</a:t>
+            </a:r>
+          </a:p>
+        </p:txBody>
+      </p:sp>
+      <p:sp>
+        <p:nvSpPr>
+          <p:cNvPr id="22" name="Rectangle 21">
+            <a:extLst>
+              <a:ext uri="{FF2B5EF4-FFF2-40B4-BE49-F238E27FC236}">
+                <a16:creationId xmlns:a16="http://schemas.microsoft.com/office/drawing/2014/main" id="{DCE2BB13-5607-4C2D-95EC-C806774D61BD}"/>
+              </a:ext>
+            </a:extLst>
+          </p:cNvPr>
+          <p:cNvSpPr/>
+          <p:nvPr/>
+        </p:nvSpPr>
+        <p:spPr>
+          <a:xfrm>
+            <a:off x="4587448" y="3621740"/>
+            <a:ext cx="1297401" cy="715737"/>
+          </a:xfrm>
+          <a:prstGeom prst="rect">
+            <a:avLst/>
+          </a:prstGeom>
+          <a:solidFill>
+            <a:schemeClr val="bg2">
+              <a:lumMod val="75000"/>
+            </a:schemeClr>
+          </a:solidFill>
+          <a:ln>
+            <a:noFill/>
+          </a:ln>
+        </p:spPr>
+        <p:style>
+          <a:lnRef idx="2">
+            <a:schemeClr val="accent1">
+              <a:shade val="50000"/>
+            </a:schemeClr>
+          </a:lnRef>
+          <a:fillRef idx="1">
+            <a:schemeClr val="accent1"/>
+          </a:fillRef>
+          <a:effectRef idx="0">
+            <a:schemeClr val="accent1"/>
+          </a:effectRef>
+          <a:fontRef idx="minor">
+            <a:schemeClr val="lt1"/>
+          </a:fontRef>
+        </p:style>
+        <p:txBody>
+          <a:bodyPr rtlCol="0" anchor="ctr"/>
+          <a:lstStyle/>
+          <a:p>
+            <a:pPr algn="ctr"/>
+            <a:r>
+              <a:rPr lang="en-US" sz="1600" b="1" dirty="0">
+                <a:solidFill>
+                  <a:schemeClr val="tx2"/>
+                </a:solidFill>
+                <a:latin typeface="Bahij Janna" panose="02040503050201020203" pitchFamily="18" charset="-78"/>
+                <a:cs typeface="Bahij Janna" panose="02040503050201020203" pitchFamily="18" charset="-78"/>
+              </a:rPr>
+              <a:t>Reg-B</a:t>
+            </a:r>
+          </a:p>
+          <a:p>
+            <a:pPr algn="ctr"/>
+            <a:r>
+              <a:rPr lang="en-US" sz="1600" b="1" dirty="0">
+                <a:solidFill>
+                  <a:schemeClr val="tx2"/>
+                </a:solidFill>
+                <a:latin typeface="Bahij Janna" panose="02040503050201020203" pitchFamily="18" charset="-78"/>
+                <a:cs typeface="Bahij Janna" panose="02040503050201020203" pitchFamily="18" charset="-78"/>
+              </a:rPr>
+              <a:t>Address</a:t>
+            </a:r>
+          </a:p>
+        </p:txBody>
+      </p:sp>
+      <p:sp>
+        <p:nvSpPr>
+          <p:cNvPr id="23" name="Rectangle 22">
+            <a:extLst>
+              <a:ext uri="{FF2B5EF4-FFF2-40B4-BE49-F238E27FC236}">
+                <a16:creationId xmlns:a16="http://schemas.microsoft.com/office/drawing/2014/main" id="{62D84CB3-E57F-43FA-B736-BCE20CD2518C}"/>
+              </a:ext>
+            </a:extLst>
+          </p:cNvPr>
+          <p:cNvSpPr/>
+          <p:nvPr/>
+        </p:nvSpPr>
+        <p:spPr>
+          <a:xfrm>
+            <a:off x="1992645" y="3621739"/>
+            <a:ext cx="3892204" cy="715737"/>
+          </a:xfrm>
+          <a:prstGeom prst="rect">
+            <a:avLst/>
+          </a:prstGeom>
+          <a:noFill/>
+          <a:ln w="28575">
+            <a:solidFill>
+              <a:schemeClr val="bg2">
+                <a:lumMod val="50000"/>
+              </a:schemeClr>
+            </a:solidFill>
+          </a:ln>
+        </p:spPr>
+        <p:style>
+          <a:lnRef idx="2">
+            <a:schemeClr val="accent1">
+              <a:shade val="50000"/>
+            </a:schemeClr>
+          </a:lnRef>
+          <a:fillRef idx="1">
+            <a:schemeClr val="accent1"/>
+          </a:fillRef>
+          <a:effectRef idx="0">
+            <a:schemeClr val="accent1"/>
+          </a:effectRef>
+          <a:fontRef idx="minor">
+            <a:schemeClr val="lt1"/>
+          </a:fontRef>
+        </p:style>
+        <p:txBody>
+          <a:bodyPr rtlCol="0" anchor="ctr"/>
+          <a:lstStyle/>
+          <a:p>
+            <a:pPr algn="ctr"/>
+            <a:endParaRPr lang="en-US"/>
+          </a:p>
+        </p:txBody>
+      </p:sp>
+      <p:cxnSp>
+        <p:nvCxnSpPr>
+          <p:cNvPr id="4" name="Straight Arrow Connector 3">
+            <a:extLst>
+              <a:ext uri="{FF2B5EF4-FFF2-40B4-BE49-F238E27FC236}">
+                <a16:creationId xmlns:a16="http://schemas.microsoft.com/office/drawing/2014/main" id="{3CBF8D29-214A-4F1E-AF13-A07E3ED8076E}"/>
+              </a:ext>
+            </a:extLst>
+          </p:cNvPr>
+          <p:cNvCxnSpPr/>
+          <p:nvPr/>
+        </p:nvCxnSpPr>
+        <p:spPr>
+          <a:xfrm>
+            <a:off x="1992645" y="3527611"/>
+            <a:ext cx="1234649" cy="0"/>
+          </a:xfrm>
+          <a:prstGeom prst="straightConnector1">
+            <a:avLst/>
+          </a:prstGeom>
+          <a:ln>
+            <a:solidFill>
+              <a:schemeClr val="bg2">
+                <a:lumMod val="50000"/>
+              </a:schemeClr>
+            </a:solidFill>
+            <a:headEnd type="triangle"/>
+            <a:tailEnd type="triangle"/>
+          </a:ln>
+        </p:spPr>
+        <p:style>
+          <a:lnRef idx="1">
+            <a:schemeClr val="accent1"/>
+          </a:lnRef>
+          <a:fillRef idx="0">
+            <a:schemeClr val="accent1"/>
+          </a:fillRef>
+          <a:effectRef idx="0">
+            <a:schemeClr val="accent1"/>
+          </a:effectRef>
+          <a:fontRef idx="minor">
+            <a:schemeClr val="tx1"/>
+          </a:fontRef>
+        </p:style>
+      </p:cxnSp>
+      <p:cxnSp>
+        <p:nvCxnSpPr>
+          <p:cNvPr id="9" name="Straight Connector 8">
+            <a:extLst>
+              <a:ext uri="{FF2B5EF4-FFF2-40B4-BE49-F238E27FC236}">
+                <a16:creationId xmlns:a16="http://schemas.microsoft.com/office/drawing/2014/main" id="{02203FB5-BEBC-42BC-A7C3-95F4941A7A32}"/>
+              </a:ext>
+            </a:extLst>
+          </p:cNvPr>
+          <p:cNvCxnSpPr>
+            <a:cxnSpLocks/>
+          </p:cNvCxnSpPr>
+          <p:nvPr/>
+        </p:nvCxnSpPr>
+        <p:spPr>
+          <a:xfrm flipV="1">
+            <a:off x="3290047" y="3214780"/>
+            <a:ext cx="0" cy="406961"/>
+          </a:xfrm>
+          <a:prstGeom prst="line">
+            <a:avLst/>
+          </a:prstGeom>
+          <a:ln w="19050">
+            <a:solidFill>
+              <a:schemeClr val="bg2">
+                <a:lumMod val="50000"/>
+              </a:schemeClr>
+            </a:solidFill>
+            <a:prstDash val="sysDash"/>
+          </a:ln>
+        </p:spPr>
+        <p:style>
+          <a:lnRef idx="1">
+            <a:schemeClr val="accent1"/>
+          </a:lnRef>
+          <a:fillRef idx="0">
+            <a:schemeClr val="accent1"/>
+          </a:fillRef>
+          <a:effectRef idx="0">
+            <a:schemeClr val="accent1"/>
+          </a:effectRef>
+          <a:fontRef idx="minor">
+            <a:schemeClr val="tx1"/>
+          </a:fontRef>
+        </p:style>
+      </p:cxnSp>
+      <p:cxnSp>
+        <p:nvCxnSpPr>
+          <p:cNvPr id="31" name="Straight Connector 30">
+            <a:extLst>
+              <a:ext uri="{FF2B5EF4-FFF2-40B4-BE49-F238E27FC236}">
+                <a16:creationId xmlns:a16="http://schemas.microsoft.com/office/drawing/2014/main" id="{FC5E1572-1EF7-4150-9C71-EBCA885EAEFA}"/>
+              </a:ext>
+            </a:extLst>
+          </p:cNvPr>
+          <p:cNvCxnSpPr>
+            <a:cxnSpLocks/>
+          </p:cNvCxnSpPr>
+          <p:nvPr/>
+        </p:nvCxnSpPr>
+        <p:spPr>
+          <a:xfrm flipV="1">
+            <a:off x="4587448" y="3214780"/>
+            <a:ext cx="0" cy="406960"/>
+          </a:xfrm>
+          <a:prstGeom prst="line">
+            <a:avLst/>
+          </a:prstGeom>
+          <a:ln w="19050">
+            <a:solidFill>
+              <a:schemeClr val="bg2">
+                <a:lumMod val="50000"/>
+              </a:schemeClr>
+            </a:solidFill>
+            <a:prstDash val="sysDash"/>
+          </a:ln>
+        </p:spPr>
+        <p:style>
+          <a:lnRef idx="1">
+            <a:schemeClr val="accent1"/>
+          </a:lnRef>
+          <a:fillRef idx="0">
+            <a:schemeClr val="accent1"/>
+          </a:fillRef>
+          <a:effectRef idx="0">
+            <a:schemeClr val="accent1"/>
+          </a:effectRef>
+          <a:fontRef idx="minor">
+            <a:schemeClr val="tx1"/>
+          </a:fontRef>
+        </p:style>
+      </p:cxnSp>
+      <p:cxnSp>
+        <p:nvCxnSpPr>
+          <p:cNvPr id="32" name="Straight Arrow Connector 31">
+            <a:extLst>
+              <a:ext uri="{FF2B5EF4-FFF2-40B4-BE49-F238E27FC236}">
+                <a16:creationId xmlns:a16="http://schemas.microsoft.com/office/drawing/2014/main" id="{F374D73C-808C-41C2-900F-30FB90B0E458}"/>
+              </a:ext>
+            </a:extLst>
+          </p:cNvPr>
+          <p:cNvCxnSpPr/>
+          <p:nvPr/>
+        </p:nvCxnSpPr>
+        <p:spPr>
+          <a:xfrm>
+            <a:off x="3322663" y="3527611"/>
+            <a:ext cx="1234649" cy="0"/>
+          </a:xfrm>
+          <a:prstGeom prst="straightConnector1">
+            <a:avLst/>
+          </a:prstGeom>
+          <a:ln>
+            <a:solidFill>
+              <a:schemeClr val="bg2">
+                <a:lumMod val="50000"/>
+              </a:schemeClr>
+            </a:solidFill>
+            <a:headEnd type="triangle"/>
+            <a:tailEnd type="triangle"/>
+          </a:ln>
+        </p:spPr>
+        <p:style>
+          <a:lnRef idx="1">
+            <a:schemeClr val="accent1"/>
+          </a:lnRef>
+          <a:fillRef idx="0">
+            <a:schemeClr val="accent1"/>
+          </a:fillRef>
+          <a:effectRef idx="0">
+            <a:schemeClr val="accent1"/>
+          </a:effectRef>
+          <a:fontRef idx="minor">
+            <a:schemeClr val="tx1"/>
+          </a:fontRef>
+        </p:style>
+      </p:cxnSp>
+      <p:cxnSp>
+        <p:nvCxnSpPr>
+          <p:cNvPr id="36" name="Straight Arrow Connector 35">
+            <a:extLst>
+              <a:ext uri="{FF2B5EF4-FFF2-40B4-BE49-F238E27FC236}">
+                <a16:creationId xmlns:a16="http://schemas.microsoft.com/office/drawing/2014/main" id="{BB983CF2-A866-4FC8-8A4B-C6F856CAB57A}"/>
+              </a:ext>
+            </a:extLst>
+          </p:cNvPr>
+          <p:cNvCxnSpPr/>
+          <p:nvPr/>
+        </p:nvCxnSpPr>
+        <p:spPr>
+          <a:xfrm>
+            <a:off x="4650200" y="3527611"/>
+            <a:ext cx="1234649" cy="0"/>
+          </a:xfrm>
+          <a:prstGeom prst="straightConnector1">
+            <a:avLst/>
+          </a:prstGeom>
+          <a:ln>
+            <a:solidFill>
+              <a:schemeClr val="bg2">
+                <a:lumMod val="50000"/>
+              </a:schemeClr>
+            </a:solidFill>
+            <a:headEnd type="triangle"/>
+            <a:tailEnd type="triangle"/>
+          </a:ln>
+        </p:spPr>
+        <p:style>
+          <a:lnRef idx="1">
+            <a:schemeClr val="accent1"/>
+          </a:lnRef>
+          <a:fillRef idx="0">
+            <a:schemeClr val="accent1"/>
+          </a:fillRef>
+          <a:effectRef idx="0">
+            <a:schemeClr val="accent1"/>
+          </a:effectRef>
+          <a:fontRef idx="minor">
+            <a:schemeClr val="tx1"/>
+          </a:fontRef>
+        </p:style>
+      </p:cxnSp>
+      <p:sp>
+        <p:nvSpPr>
+          <p:cNvPr id="37" name="TextBox 36">
+            <a:extLst>
+              <a:ext uri="{FF2B5EF4-FFF2-40B4-BE49-F238E27FC236}">
+                <a16:creationId xmlns:a16="http://schemas.microsoft.com/office/drawing/2014/main" id="{C422C698-CCC3-4E23-86A1-50139C39AB75}"/>
+              </a:ext>
+            </a:extLst>
+          </p:cNvPr>
+          <p:cNvSpPr txBox="1"/>
+          <p:nvPr/>
+        </p:nvSpPr>
+        <p:spPr>
+          <a:xfrm>
+            <a:off x="1992645" y="3214780"/>
+            <a:ext cx="1297401" cy="338554"/>
+          </a:xfrm>
+          <a:prstGeom prst="rect">
+            <a:avLst/>
+          </a:prstGeom>
+          <a:noFill/>
+        </p:spPr>
+        <p:txBody>
+          <a:bodyPr wrap="square" rtlCol="0">
+            <a:spAutoFit/>
+          </a:bodyPr>
+          <a:lstStyle/>
+          <a:p>
+            <a:pPr algn="ctr"/>
+            <a:r>
+              <a:rPr lang="en-US" sz="1600" b="1" dirty="0">
+                <a:solidFill>
+                  <a:schemeClr val="tx1">
+                    <a:lumMod val="65000"/>
+                    <a:lumOff val="35000"/>
+                  </a:schemeClr>
+                </a:solidFill>
+                <a:latin typeface="Bahij Janna" panose="02040503050201020203" pitchFamily="18" charset="-78"/>
+                <a:cs typeface="Bahij Janna" panose="02040503050201020203" pitchFamily="18" charset="-78"/>
+              </a:rPr>
+              <a:t>3-bits</a:t>
+            </a:r>
+          </a:p>
+        </p:txBody>
+      </p:sp>
+      <p:sp>
+        <p:nvSpPr>
+          <p:cNvPr id="39" name="TextBox 38">
+            <a:extLst>
+              <a:ext uri="{FF2B5EF4-FFF2-40B4-BE49-F238E27FC236}">
+                <a16:creationId xmlns:a16="http://schemas.microsoft.com/office/drawing/2014/main" id="{44DB0267-BC23-4BEE-AFD3-D6FAC6FAED8B}"/>
+              </a:ext>
+            </a:extLst>
+          </p:cNvPr>
+          <p:cNvSpPr txBox="1"/>
+          <p:nvPr/>
+        </p:nvSpPr>
+        <p:spPr>
+          <a:xfrm>
+            <a:off x="3281083" y="3214780"/>
+            <a:ext cx="1297401" cy="338554"/>
+          </a:xfrm>
+          <a:prstGeom prst="rect">
+            <a:avLst/>
+          </a:prstGeom>
+          <a:noFill/>
+        </p:spPr>
+        <p:txBody>
+          <a:bodyPr wrap="square" rtlCol="0">
+            <a:spAutoFit/>
+          </a:bodyPr>
+          <a:lstStyle/>
+          <a:p>
+            <a:pPr algn="ctr"/>
+            <a:r>
+              <a:rPr lang="en-US" sz="1600" b="1" dirty="0">
+                <a:solidFill>
+                  <a:schemeClr val="tx1">
+                    <a:lumMod val="65000"/>
+                    <a:lumOff val="35000"/>
+                  </a:schemeClr>
+                </a:solidFill>
+                <a:latin typeface="Bahij Janna" panose="02040503050201020203" pitchFamily="18" charset="-78"/>
+                <a:cs typeface="Bahij Janna" panose="02040503050201020203" pitchFamily="18" charset="-78"/>
+              </a:rPr>
+              <a:t>3-bits</a:t>
+            </a:r>
+          </a:p>
+        </p:txBody>
+      </p:sp>
+      <p:sp>
+        <p:nvSpPr>
+          <p:cNvPr id="40" name="TextBox 39">
+            <a:extLst>
+              <a:ext uri="{FF2B5EF4-FFF2-40B4-BE49-F238E27FC236}">
+                <a16:creationId xmlns:a16="http://schemas.microsoft.com/office/drawing/2014/main" id="{C9F35832-AE42-47FA-B6F4-F5C34B7BC785}"/>
+              </a:ext>
+            </a:extLst>
+          </p:cNvPr>
+          <p:cNvSpPr txBox="1"/>
+          <p:nvPr/>
+        </p:nvSpPr>
+        <p:spPr>
+          <a:xfrm>
+            <a:off x="4632273" y="3214780"/>
+            <a:ext cx="1297401" cy="338554"/>
+          </a:xfrm>
+          <a:prstGeom prst="rect">
+            <a:avLst/>
+          </a:prstGeom>
+          <a:noFill/>
+        </p:spPr>
+        <p:txBody>
+          <a:bodyPr wrap="square" rtlCol="0">
+            <a:spAutoFit/>
+          </a:bodyPr>
+          <a:lstStyle/>
+          <a:p>
+            <a:pPr algn="ctr"/>
+            <a:r>
+              <a:rPr lang="en-US" sz="1600" b="1" dirty="0">
+                <a:solidFill>
+                  <a:schemeClr val="tx1">
+                    <a:lumMod val="65000"/>
+                    <a:lumOff val="35000"/>
+                  </a:schemeClr>
+                </a:solidFill>
+                <a:latin typeface="Bahij Janna" panose="02040503050201020203" pitchFamily="18" charset="-78"/>
+                <a:cs typeface="Bahij Janna" panose="02040503050201020203" pitchFamily="18" charset="-78"/>
+              </a:rPr>
+              <a:t>3-bits</a:t>
+            </a:r>
+          </a:p>
+        </p:txBody>
+      </p:sp>
+      <p:sp>
+        <p:nvSpPr>
+          <p:cNvPr id="43" name="TextBox 42">
+            <a:extLst>
+              <a:ext uri="{FF2B5EF4-FFF2-40B4-BE49-F238E27FC236}">
+                <a16:creationId xmlns:a16="http://schemas.microsoft.com/office/drawing/2014/main" id="{BAC23700-7BA2-4A0A-91A1-47B265934DEA}"/>
+              </a:ext>
+            </a:extLst>
+          </p:cNvPr>
+          <p:cNvSpPr txBox="1"/>
+          <p:nvPr/>
+        </p:nvSpPr>
+        <p:spPr>
+          <a:xfrm>
+            <a:off x="2483985" y="4548417"/>
+            <a:ext cx="2796988" cy="338554"/>
+          </a:xfrm>
+          <a:prstGeom prst="rect">
+            <a:avLst/>
+          </a:prstGeom>
+          <a:noFill/>
+        </p:spPr>
+        <p:txBody>
+          <a:bodyPr wrap="square" rtlCol="0">
+            <a:spAutoFit/>
+          </a:bodyPr>
+          <a:lstStyle/>
+          <a:p>
+            <a:pPr algn="ctr"/>
+            <a:r>
+              <a:rPr lang="en-US" sz="1600" b="1" dirty="0">
+                <a:solidFill>
+                  <a:schemeClr val="tx1">
+                    <a:lumMod val="65000"/>
+                    <a:lumOff val="35000"/>
+                  </a:schemeClr>
+                </a:solidFill>
+                <a:latin typeface="Bahij Janna" panose="02040503050201020203" pitchFamily="18" charset="-78"/>
+                <a:cs typeface="Bahij Janna" panose="02040503050201020203" pitchFamily="18" charset="-78"/>
+              </a:rPr>
+              <a:t>9-bits function format</a:t>
+            </a:r>
+          </a:p>
+        </p:txBody>
+      </p:sp>
+      <p:cxnSp>
+        <p:nvCxnSpPr>
+          <p:cNvPr id="44" name="Straight Arrow Connector 43">
+            <a:extLst>
+              <a:ext uri="{FF2B5EF4-FFF2-40B4-BE49-F238E27FC236}">
+                <a16:creationId xmlns:a16="http://schemas.microsoft.com/office/drawing/2014/main" id="{888DE81A-7A82-4FA5-9248-CF3AEE5DC48B}"/>
+              </a:ext>
+            </a:extLst>
+          </p:cNvPr>
+          <p:cNvCxnSpPr>
+            <a:cxnSpLocks/>
+          </p:cNvCxnSpPr>
+          <p:nvPr/>
+        </p:nvCxnSpPr>
+        <p:spPr>
+          <a:xfrm>
+            <a:off x="1992644" y="4495800"/>
+            <a:ext cx="3892205" cy="0"/>
+          </a:xfrm>
+          <a:prstGeom prst="straightConnector1">
+            <a:avLst/>
+          </a:prstGeom>
+          <a:ln>
+            <a:solidFill>
+              <a:schemeClr val="bg2">
+                <a:lumMod val="50000"/>
+              </a:schemeClr>
+            </a:solidFill>
+            <a:headEnd type="triangle"/>
+            <a:tailEnd type="triangle"/>
+          </a:ln>
+        </p:spPr>
+        <p:style>
+          <a:lnRef idx="1">
+            <a:schemeClr val="accent1"/>
+          </a:lnRef>
+          <a:fillRef idx="0">
+            <a:schemeClr val="accent1"/>
+          </a:fillRef>
+          <a:effectRef idx="0">
+            <a:schemeClr val="accent1"/>
+          </a:effectRef>
+          <a:fontRef idx="minor">
+            <a:schemeClr val="tx1"/>
+          </a:fontRef>
+        </p:style>
+      </p:cxnSp>
+    </p:spTree>
+    <p:extLst>
+      <p:ext uri="{BB962C8B-B14F-4D97-AF65-F5344CB8AC3E}">
+        <p14:creationId xmlns:p14="http://schemas.microsoft.com/office/powerpoint/2010/main" val="3349940806"/>
       </p:ext>
     </p:extLst>
   </p:cSld>

</xml_diff>